<commit_message>
added searching in linux
</commit_message>
<xml_diff>
--- a/Study/Object Oriented Design/Week 1 Objectives.pptx
+++ b/Study/Object Oriented Design/Week 1 Objectives.pptx
@@ -19,6 +19,8 @@
     <p:sldId id="265" r:id="rId13"/>
     <p:sldId id="268" r:id="rId14"/>
     <p:sldId id="269" r:id="rId15"/>
+    <p:sldId id="271" r:id="rId16"/>
+    <p:sldId id="270" r:id="rId17"/>
   </p:sldIdLst>
   <p:sldSz cx="12192000" cy="6858000"/>
   <p:notesSz cx="6858000" cy="9144000"/>
@@ -354,7 +356,7 @@
           <a:p>
             <a:fld id="{E26E7A6D-C62F-4F7B-AB9A-BB912D12E382}" type="datetimeFigureOut">
               <a:rPr lang="en-US" smtClean="0"/>
-              <a:t>4/14/2023</a:t>
+              <a:t>4/26/2023</a:t>
             </a:fld>
             <a:endParaRPr lang="en-US"/>
           </a:p>
@@ -688,7 +690,7 @@
           <a:p>
             <a:fld id="{E26E7A6D-C62F-4F7B-AB9A-BB912D12E382}" type="datetimeFigureOut">
               <a:rPr lang="en-US" smtClean="0"/>
-              <a:t>4/14/2023</a:t>
+              <a:t>4/26/2023</a:t>
             </a:fld>
             <a:endParaRPr lang="en-US"/>
           </a:p>
@@ -966,7 +968,7 @@
           <a:p>
             <a:fld id="{E26E7A6D-C62F-4F7B-AB9A-BB912D12E382}" type="datetimeFigureOut">
               <a:rPr lang="en-US" smtClean="0"/>
-              <a:t>4/14/2023</a:t>
+              <a:t>4/26/2023</a:t>
             </a:fld>
             <a:endParaRPr lang="en-US"/>
           </a:p>
@@ -1534,7 +1536,7 @@
           <a:p>
             <a:fld id="{E26E7A6D-C62F-4F7B-AB9A-BB912D12E382}" type="datetimeFigureOut">
               <a:rPr lang="en-US" smtClean="0"/>
-              <a:t>4/14/2023</a:t>
+              <a:t>4/26/2023</a:t>
             </a:fld>
             <a:endParaRPr lang="en-US"/>
           </a:p>
@@ -1812,7 +1814,7 @@
           <a:p>
             <a:fld id="{E26E7A6D-C62F-4F7B-AB9A-BB912D12E382}" type="datetimeFigureOut">
               <a:rPr lang="en-US" smtClean="0"/>
-              <a:t>4/14/2023</a:t>
+              <a:t>4/26/2023</a:t>
             </a:fld>
             <a:endParaRPr lang="en-US"/>
           </a:p>
@@ -2374,7 +2376,7 @@
           <a:p>
             <a:fld id="{E26E7A6D-C62F-4F7B-AB9A-BB912D12E382}" type="datetimeFigureOut">
               <a:rPr lang="en-US" smtClean="0"/>
-              <a:t>4/14/2023</a:t>
+              <a:t>4/26/2023</a:t>
             </a:fld>
             <a:endParaRPr lang="en-US"/>
           </a:p>
@@ -2701,7 +2703,7 @@
           <a:p>
             <a:fld id="{E26E7A6D-C62F-4F7B-AB9A-BB912D12E382}" type="datetimeFigureOut">
               <a:rPr lang="en-US" smtClean="0"/>
-              <a:t>4/14/2023</a:t>
+              <a:t>4/26/2023</a:t>
             </a:fld>
             <a:endParaRPr lang="en-US"/>
           </a:p>
@@ -2878,7 +2880,7 @@
           <a:p>
             <a:fld id="{E26E7A6D-C62F-4F7B-AB9A-BB912D12E382}" type="datetimeFigureOut">
               <a:rPr lang="en-US" smtClean="0"/>
-              <a:t>4/14/2023</a:t>
+              <a:t>4/26/2023</a:t>
             </a:fld>
             <a:endParaRPr lang="en-US"/>
           </a:p>
@@ -3116,7 +3118,7 @@
           <a:p>
             <a:fld id="{E26E7A6D-C62F-4F7B-AB9A-BB912D12E382}" type="datetimeFigureOut">
               <a:rPr lang="en-US" smtClean="0"/>
-              <a:t>4/14/2023</a:t>
+              <a:t>4/26/2023</a:t>
             </a:fld>
             <a:endParaRPr lang="en-US"/>
           </a:p>
@@ -3316,7 +3318,7 @@
           <a:p>
             <a:fld id="{E26E7A6D-C62F-4F7B-AB9A-BB912D12E382}" type="datetimeFigureOut">
               <a:rPr lang="en-US" smtClean="0"/>
-              <a:t>4/14/2023</a:t>
+              <a:t>4/26/2023</a:t>
             </a:fld>
             <a:endParaRPr lang="en-US"/>
           </a:p>
@@ -3592,7 +3594,7 @@
           <a:p>
             <a:fld id="{E26E7A6D-C62F-4F7B-AB9A-BB912D12E382}" type="datetimeFigureOut">
               <a:rPr lang="en-US" smtClean="0"/>
-              <a:t>4/14/2023</a:t>
+              <a:t>4/26/2023</a:t>
             </a:fld>
             <a:endParaRPr lang="en-US"/>
           </a:p>
@@ -3858,7 +3860,7 @@
           <a:p>
             <a:fld id="{E26E7A6D-C62F-4F7B-AB9A-BB912D12E382}" type="datetimeFigureOut">
               <a:rPr lang="en-US" smtClean="0"/>
-              <a:t>4/14/2023</a:t>
+              <a:t>4/26/2023</a:t>
             </a:fld>
             <a:endParaRPr lang="en-US"/>
           </a:p>
@@ -4232,7 +4234,7 @@
           <a:p>
             <a:fld id="{E26E7A6D-C62F-4F7B-AB9A-BB912D12E382}" type="datetimeFigureOut">
               <a:rPr lang="en-US" smtClean="0"/>
-              <a:t>4/14/2023</a:t>
+              <a:t>4/26/2023</a:t>
             </a:fld>
             <a:endParaRPr lang="en-US"/>
           </a:p>
@@ -4380,7 +4382,7 @@
           <a:p>
             <a:fld id="{E26E7A6D-C62F-4F7B-AB9A-BB912D12E382}" type="datetimeFigureOut">
               <a:rPr lang="en-US" smtClean="0"/>
-              <a:t>4/14/2023</a:t>
+              <a:t>4/26/2023</a:t>
             </a:fld>
             <a:endParaRPr lang="en-US"/>
           </a:p>
@@ -4505,7 +4507,7 @@
           <a:p>
             <a:fld id="{E26E7A6D-C62F-4F7B-AB9A-BB912D12E382}" type="datetimeFigureOut">
               <a:rPr lang="en-US" smtClean="0"/>
-              <a:t>4/14/2023</a:t>
+              <a:t>4/26/2023</a:t>
             </a:fld>
             <a:endParaRPr lang="en-US"/>
           </a:p>
@@ -4790,7 +4792,7 @@
           <a:p>
             <a:fld id="{E26E7A6D-C62F-4F7B-AB9A-BB912D12E382}" type="datetimeFigureOut">
               <a:rPr lang="en-US" smtClean="0"/>
-              <a:t>4/14/2023</a:t>
+              <a:t>4/26/2023</a:t>
             </a:fld>
             <a:endParaRPr lang="en-US"/>
           </a:p>
@@ -5114,7 +5116,7 @@
           <a:p>
             <a:fld id="{E26E7A6D-C62F-4F7B-AB9A-BB912D12E382}" type="datetimeFigureOut">
               <a:rPr lang="en-US" smtClean="0"/>
-              <a:t>4/14/2023</a:t>
+              <a:t>4/26/2023</a:t>
             </a:fld>
             <a:endParaRPr lang="en-US"/>
           </a:p>
@@ -5328,7 +5330,7 @@
           <a:p>
             <a:fld id="{E26E7A6D-C62F-4F7B-AB9A-BB912D12E382}" type="datetimeFigureOut">
               <a:rPr lang="en-US" smtClean="0"/>
-              <a:t>4/14/2023</a:t>
+              <a:t>4/26/2023</a:t>
             </a:fld>
             <a:endParaRPr lang="en-US"/>
           </a:p>
@@ -6654,6 +6656,213 @@
 </p:sld>
 </file>
 
+<file path=ppt/slides/slide15.xml><?xml version="1.0" encoding="utf-8"?>
+<p:sld xmlns:a="http://schemas.openxmlformats.org/drawingml/2006/main" xmlns:r="http://schemas.openxmlformats.org/officeDocument/2006/relationships" xmlns:p="http://schemas.openxmlformats.org/presentationml/2006/main">
+  <p:cSld>
+    <p:spTree>
+      <p:nvGrpSpPr>
+        <p:cNvPr id="1" name=""/>
+        <p:cNvGrpSpPr/>
+        <p:nvPr/>
+      </p:nvGrpSpPr>
+      <p:grpSpPr>
+        <a:xfrm>
+          <a:off x="0" y="0"/>
+          <a:ext cx="0" cy="0"/>
+          <a:chOff x="0" y="0"/>
+          <a:chExt cx="0" cy="0"/>
+        </a:xfrm>
+      </p:grpSpPr>
+      <p:sp>
+        <p:nvSpPr>
+          <p:cNvPr id="2" name="Title 1">
+            <a:extLst>
+              <a:ext uri="{FF2B5EF4-FFF2-40B4-BE49-F238E27FC236}">
+                <a16:creationId xmlns:a16="http://schemas.microsoft.com/office/drawing/2014/main" id="{BAB70B7B-E3DB-C3E6-AA13-63CDDE1C7982}"/>
+              </a:ext>
+            </a:extLst>
+          </p:cNvPr>
+          <p:cNvSpPr>
+            <a:spLocks noGrp="1"/>
+          </p:cNvSpPr>
+          <p:nvPr>
+            <p:ph type="title"/>
+          </p:nvPr>
+        </p:nvSpPr>
+        <p:spPr/>
+        <p:txBody>
+          <a:bodyPr/>
+          <a:lstStyle/>
+          <a:p>
+            <a:r>
+              <a:rPr lang="en-US" dirty="0"/>
+              <a:t>Requirements Types</a:t>
+            </a:r>
+          </a:p>
+        </p:txBody>
+      </p:sp>
+      <p:sp>
+        <p:nvSpPr>
+          <p:cNvPr id="3" name="Content Placeholder 2">
+            <a:extLst>
+              <a:ext uri="{FF2B5EF4-FFF2-40B4-BE49-F238E27FC236}">
+                <a16:creationId xmlns:a16="http://schemas.microsoft.com/office/drawing/2014/main" id="{A7314601-B3EA-49B9-E10E-FF172E1582F8}"/>
+              </a:ext>
+            </a:extLst>
+          </p:cNvPr>
+          <p:cNvSpPr>
+            <a:spLocks noGrp="1"/>
+          </p:cNvSpPr>
+          <p:nvPr>
+            <p:ph idx="1"/>
+          </p:nvPr>
+        </p:nvSpPr>
+        <p:spPr/>
+        <p:txBody>
+          <a:bodyPr>
+            <a:normAutofit/>
+          </a:bodyPr>
+          <a:lstStyle/>
+          <a:p>
+            <a:pPr marL="342900" indent="-342900">
+              <a:buFont typeface="+mj-lt"/>
+              <a:buAutoNum type="arabicPeriod"/>
+            </a:pPr>
+            <a:r>
+              <a:rPr lang="en-US" sz="3600" dirty="0"/>
+              <a:t>Functional Requirements</a:t>
+            </a:r>
+          </a:p>
+          <a:p>
+            <a:pPr marL="342900" indent="-342900">
+              <a:buFont typeface="+mj-lt"/>
+              <a:buAutoNum type="arabicPeriod"/>
+            </a:pPr>
+            <a:r>
+              <a:rPr lang="en-US" sz="3600" dirty="0"/>
+              <a:t>Non-Functional Requirements</a:t>
+            </a:r>
+          </a:p>
+        </p:txBody>
+      </p:sp>
+    </p:spTree>
+    <p:extLst>
+      <p:ext uri="{BB962C8B-B14F-4D97-AF65-F5344CB8AC3E}">
+        <p14:creationId xmlns:p14="http://schemas.microsoft.com/office/powerpoint/2010/main" val="3215409304"/>
+      </p:ext>
+    </p:extLst>
+  </p:cSld>
+  <p:clrMapOvr>
+    <a:masterClrMapping/>
+  </p:clrMapOvr>
+</p:sld>
+</file>
+
+<file path=ppt/slides/slide16.xml><?xml version="1.0" encoding="utf-8"?>
+<p:sld xmlns:a="http://schemas.openxmlformats.org/drawingml/2006/main" xmlns:r="http://schemas.openxmlformats.org/officeDocument/2006/relationships" xmlns:p="http://schemas.openxmlformats.org/presentationml/2006/main">
+  <p:cSld>
+    <p:spTree>
+      <p:nvGrpSpPr>
+        <p:cNvPr id="1" name=""/>
+        <p:cNvGrpSpPr/>
+        <p:nvPr/>
+      </p:nvGrpSpPr>
+      <p:grpSpPr>
+        <a:xfrm>
+          <a:off x="0" y="0"/>
+          <a:ext cx="0" cy="0"/>
+          <a:chOff x="0" y="0"/>
+          <a:chExt cx="0" cy="0"/>
+        </a:xfrm>
+      </p:grpSpPr>
+      <p:sp>
+        <p:nvSpPr>
+          <p:cNvPr id="2" name="Title 1">
+            <a:extLst>
+              <a:ext uri="{FF2B5EF4-FFF2-40B4-BE49-F238E27FC236}">
+                <a16:creationId xmlns:a16="http://schemas.microsoft.com/office/drawing/2014/main" id="{4EC68F39-B51B-331B-A39B-7C7B2FF08DDA}"/>
+              </a:ext>
+            </a:extLst>
+          </p:cNvPr>
+          <p:cNvSpPr>
+            <a:spLocks noGrp="1"/>
+          </p:cNvSpPr>
+          <p:nvPr>
+            <p:ph type="title"/>
+          </p:nvPr>
+        </p:nvSpPr>
+        <p:spPr/>
+        <p:txBody>
+          <a:bodyPr/>
+          <a:lstStyle/>
+          <a:p>
+            <a:r>
+              <a:rPr lang="en-US" dirty="0"/>
+              <a:t>Quality Attributes</a:t>
+            </a:r>
+          </a:p>
+        </p:txBody>
+      </p:sp>
+      <p:sp>
+        <p:nvSpPr>
+          <p:cNvPr id="3" name="Content Placeholder 2">
+            <a:extLst>
+              <a:ext uri="{FF2B5EF4-FFF2-40B4-BE49-F238E27FC236}">
+                <a16:creationId xmlns:a16="http://schemas.microsoft.com/office/drawing/2014/main" id="{60F064F7-DE17-4E71-505D-49E391402228}"/>
+              </a:ext>
+            </a:extLst>
+          </p:cNvPr>
+          <p:cNvSpPr>
+            <a:spLocks noGrp="1"/>
+          </p:cNvSpPr>
+          <p:nvPr>
+            <p:ph idx="1"/>
+          </p:nvPr>
+        </p:nvSpPr>
+        <p:spPr/>
+        <p:txBody>
+          <a:bodyPr>
+            <a:normAutofit/>
+          </a:bodyPr>
+          <a:lstStyle/>
+          <a:p>
+            <a:r>
+              <a:rPr lang="en-US" sz="2000" dirty="0"/>
+              <a:t>First you have to define what type of requirements you are comparing the quality attributes for, for example for the functional requirements you might say correctness is not negotiable</a:t>
+            </a:r>
+          </a:p>
+          <a:p>
+            <a:r>
+              <a:rPr lang="en-US" sz="2000" dirty="0"/>
+              <a:t>Then for the non-functional requirements quality attributes you can negotiate on and see the consequences of each</a:t>
+            </a:r>
+          </a:p>
+          <a:p>
+            <a:r>
+              <a:rPr lang="en-US" sz="2000" dirty="0"/>
+              <a:t>After the implementation has been constructed the quality attributes must </a:t>
+            </a:r>
+            <a:r>
+              <a:rPr lang="en-US" sz="2000"/>
+              <a:t>be reviewed and tested</a:t>
+            </a:r>
+            <a:endParaRPr lang="en-US" sz="2000" dirty="0"/>
+          </a:p>
+        </p:txBody>
+      </p:sp>
+    </p:spTree>
+    <p:extLst>
+      <p:ext uri="{BB962C8B-B14F-4D97-AF65-F5344CB8AC3E}">
+        <p14:creationId xmlns:p14="http://schemas.microsoft.com/office/powerpoint/2010/main" val="2919584886"/>
+      </p:ext>
+    </p:extLst>
+  </p:cSld>
+  <p:clrMapOvr>
+    <a:masterClrMapping/>
+  </p:clrMapOvr>
+</p:sld>
+</file>
+
 <file path=ppt/slides/slide2.xml><?xml version="1.0" encoding="utf-8"?>
 <p:sld xmlns:a="http://schemas.openxmlformats.org/drawingml/2006/main" xmlns:r="http://schemas.openxmlformats.org/officeDocument/2006/relationships" xmlns:p="http://schemas.openxmlformats.org/presentationml/2006/main">
   <p:cSld>

</xml_diff>

<commit_message>
addes algebra intermediate book
</commit_message>
<xml_diff>
--- a/Study/Object Oriented Design/Week 1 Objectives.pptx
+++ b/Study/Object Oriented Design/Week 1 Objectives.pptx
@@ -21,6 +21,23 @@
     <p:sldId id="269" r:id="rId15"/>
     <p:sldId id="271" r:id="rId16"/>
     <p:sldId id="270" r:id="rId17"/>
+    <p:sldId id="272" r:id="rId18"/>
+    <p:sldId id="273" r:id="rId19"/>
+    <p:sldId id="274" r:id="rId20"/>
+    <p:sldId id="288" r:id="rId21"/>
+    <p:sldId id="275" r:id="rId22"/>
+    <p:sldId id="276" r:id="rId23"/>
+    <p:sldId id="278" r:id="rId24"/>
+    <p:sldId id="279" r:id="rId25"/>
+    <p:sldId id="280" r:id="rId26"/>
+    <p:sldId id="285" r:id="rId27"/>
+    <p:sldId id="281" r:id="rId28"/>
+    <p:sldId id="282" r:id="rId29"/>
+    <p:sldId id="286" r:id="rId30"/>
+    <p:sldId id="283" r:id="rId31"/>
+    <p:sldId id="284" r:id="rId32"/>
+    <p:sldId id="287" r:id="rId33"/>
+    <p:sldId id="277" r:id="rId34"/>
   </p:sldIdLst>
   <p:sldSz cx="12192000" cy="6858000"/>
   <p:notesSz cx="6858000" cy="9144000"/>
@@ -356,7 +373,7 @@
           <a:p>
             <a:fld id="{E26E7A6D-C62F-4F7B-AB9A-BB912D12E382}" type="datetimeFigureOut">
               <a:rPr lang="en-US" smtClean="0"/>
-              <a:t>5/5/2023</a:t>
+              <a:t>5/26/2023</a:t>
             </a:fld>
             <a:endParaRPr lang="en-US"/>
           </a:p>
@@ -690,7 +707,7 @@
           <a:p>
             <a:fld id="{E26E7A6D-C62F-4F7B-AB9A-BB912D12E382}" type="datetimeFigureOut">
               <a:rPr lang="en-US" smtClean="0"/>
-              <a:t>5/5/2023</a:t>
+              <a:t>5/26/2023</a:t>
             </a:fld>
             <a:endParaRPr lang="en-US"/>
           </a:p>
@@ -968,7 +985,7 @@
           <a:p>
             <a:fld id="{E26E7A6D-C62F-4F7B-AB9A-BB912D12E382}" type="datetimeFigureOut">
               <a:rPr lang="en-US" smtClean="0"/>
-              <a:t>5/5/2023</a:t>
+              <a:t>5/26/2023</a:t>
             </a:fld>
             <a:endParaRPr lang="en-US"/>
           </a:p>
@@ -1536,7 +1553,7 @@
           <a:p>
             <a:fld id="{E26E7A6D-C62F-4F7B-AB9A-BB912D12E382}" type="datetimeFigureOut">
               <a:rPr lang="en-US" smtClean="0"/>
-              <a:t>5/5/2023</a:t>
+              <a:t>5/26/2023</a:t>
             </a:fld>
             <a:endParaRPr lang="en-US"/>
           </a:p>
@@ -1814,7 +1831,7 @@
           <a:p>
             <a:fld id="{E26E7A6D-C62F-4F7B-AB9A-BB912D12E382}" type="datetimeFigureOut">
               <a:rPr lang="en-US" smtClean="0"/>
-              <a:t>5/5/2023</a:t>
+              <a:t>5/26/2023</a:t>
             </a:fld>
             <a:endParaRPr lang="en-US"/>
           </a:p>
@@ -2376,7 +2393,7 @@
           <a:p>
             <a:fld id="{E26E7A6D-C62F-4F7B-AB9A-BB912D12E382}" type="datetimeFigureOut">
               <a:rPr lang="en-US" smtClean="0"/>
-              <a:t>5/5/2023</a:t>
+              <a:t>5/26/2023</a:t>
             </a:fld>
             <a:endParaRPr lang="en-US"/>
           </a:p>
@@ -2703,7 +2720,7 @@
           <a:p>
             <a:fld id="{E26E7A6D-C62F-4F7B-AB9A-BB912D12E382}" type="datetimeFigureOut">
               <a:rPr lang="en-US" smtClean="0"/>
-              <a:t>5/5/2023</a:t>
+              <a:t>5/26/2023</a:t>
             </a:fld>
             <a:endParaRPr lang="en-US"/>
           </a:p>
@@ -2880,7 +2897,7 @@
           <a:p>
             <a:fld id="{E26E7A6D-C62F-4F7B-AB9A-BB912D12E382}" type="datetimeFigureOut">
               <a:rPr lang="en-US" smtClean="0"/>
-              <a:t>5/5/2023</a:t>
+              <a:t>5/26/2023</a:t>
             </a:fld>
             <a:endParaRPr lang="en-US"/>
           </a:p>
@@ -3118,7 +3135,7 @@
           <a:p>
             <a:fld id="{E26E7A6D-C62F-4F7B-AB9A-BB912D12E382}" type="datetimeFigureOut">
               <a:rPr lang="en-US" smtClean="0"/>
-              <a:t>5/5/2023</a:t>
+              <a:t>5/26/2023</a:t>
             </a:fld>
             <a:endParaRPr lang="en-US"/>
           </a:p>
@@ -3318,7 +3335,7 @@
           <a:p>
             <a:fld id="{E26E7A6D-C62F-4F7B-AB9A-BB912D12E382}" type="datetimeFigureOut">
               <a:rPr lang="en-US" smtClean="0"/>
-              <a:t>5/5/2023</a:t>
+              <a:t>5/26/2023</a:t>
             </a:fld>
             <a:endParaRPr lang="en-US"/>
           </a:p>
@@ -3594,7 +3611,7 @@
           <a:p>
             <a:fld id="{E26E7A6D-C62F-4F7B-AB9A-BB912D12E382}" type="datetimeFigureOut">
               <a:rPr lang="en-US" smtClean="0"/>
-              <a:t>5/5/2023</a:t>
+              <a:t>5/26/2023</a:t>
             </a:fld>
             <a:endParaRPr lang="en-US"/>
           </a:p>
@@ -3860,7 +3877,7 @@
           <a:p>
             <a:fld id="{E26E7A6D-C62F-4F7B-AB9A-BB912D12E382}" type="datetimeFigureOut">
               <a:rPr lang="en-US" smtClean="0"/>
-              <a:t>5/5/2023</a:t>
+              <a:t>5/26/2023</a:t>
             </a:fld>
             <a:endParaRPr lang="en-US"/>
           </a:p>
@@ -4234,7 +4251,7 @@
           <a:p>
             <a:fld id="{E26E7A6D-C62F-4F7B-AB9A-BB912D12E382}" type="datetimeFigureOut">
               <a:rPr lang="en-US" smtClean="0"/>
-              <a:t>5/5/2023</a:t>
+              <a:t>5/26/2023</a:t>
             </a:fld>
             <a:endParaRPr lang="en-US"/>
           </a:p>
@@ -4382,7 +4399,7 @@
           <a:p>
             <a:fld id="{E26E7A6D-C62F-4F7B-AB9A-BB912D12E382}" type="datetimeFigureOut">
               <a:rPr lang="en-US" smtClean="0"/>
-              <a:t>5/5/2023</a:t>
+              <a:t>5/26/2023</a:t>
             </a:fld>
             <a:endParaRPr lang="en-US"/>
           </a:p>
@@ -4507,7 +4524,7 @@
           <a:p>
             <a:fld id="{E26E7A6D-C62F-4F7B-AB9A-BB912D12E382}" type="datetimeFigureOut">
               <a:rPr lang="en-US" smtClean="0"/>
-              <a:t>5/5/2023</a:t>
+              <a:t>5/26/2023</a:t>
             </a:fld>
             <a:endParaRPr lang="en-US"/>
           </a:p>
@@ -4792,7 +4809,7 @@
           <a:p>
             <a:fld id="{E26E7A6D-C62F-4F7B-AB9A-BB912D12E382}" type="datetimeFigureOut">
               <a:rPr lang="en-US" smtClean="0"/>
-              <a:t>5/5/2023</a:t>
+              <a:t>5/26/2023</a:t>
             </a:fld>
             <a:endParaRPr lang="en-US"/>
           </a:p>
@@ -5116,7 +5133,7 @@
           <a:p>
             <a:fld id="{E26E7A6D-C62F-4F7B-AB9A-BB912D12E382}" type="datetimeFigureOut">
               <a:rPr lang="en-US" smtClean="0"/>
-              <a:t>5/5/2023</a:t>
+              <a:t>5/26/2023</a:t>
             </a:fld>
             <a:endParaRPr lang="en-US"/>
           </a:p>
@@ -5330,7 +5347,7 @@
           <a:p>
             <a:fld id="{E26E7A6D-C62F-4F7B-AB9A-BB912D12E382}" type="datetimeFigureOut">
               <a:rPr lang="en-US" smtClean="0"/>
-              <a:t>5/5/2023</a:t>
+              <a:t>5/26/2023</a:t>
             </a:fld>
             <a:endParaRPr lang="en-US"/>
           </a:p>
@@ -6863,6 +6880,316 @@
 </p:sld>
 </file>
 
+<file path=ppt/slides/slide17.xml><?xml version="1.0" encoding="utf-8"?>
+<p:sld xmlns:a="http://schemas.openxmlformats.org/drawingml/2006/main" xmlns:r="http://schemas.openxmlformats.org/officeDocument/2006/relationships" xmlns:p="http://schemas.openxmlformats.org/presentationml/2006/main">
+  <p:cSld>
+    <p:spTree>
+      <p:nvGrpSpPr>
+        <p:cNvPr id="1" name=""/>
+        <p:cNvGrpSpPr/>
+        <p:nvPr/>
+      </p:nvGrpSpPr>
+      <p:grpSpPr>
+        <a:xfrm>
+          <a:off x="0" y="0"/>
+          <a:ext cx="0" cy="0"/>
+          <a:chOff x="0" y="0"/>
+          <a:chExt cx="0" cy="0"/>
+        </a:xfrm>
+      </p:grpSpPr>
+      <p:sp>
+        <p:nvSpPr>
+          <p:cNvPr id="2" name="Title 1">
+            <a:extLst>
+              <a:ext uri="{FF2B5EF4-FFF2-40B4-BE49-F238E27FC236}">
+                <a16:creationId xmlns:a16="http://schemas.microsoft.com/office/drawing/2014/main" id="{1EEE6435-624C-D084-00C8-FCDFD1AB47E2}"/>
+              </a:ext>
+            </a:extLst>
+          </p:cNvPr>
+          <p:cNvSpPr>
+            <a:spLocks noGrp="1"/>
+          </p:cNvSpPr>
+          <p:nvPr>
+            <p:ph type="title"/>
+          </p:nvPr>
+        </p:nvSpPr>
+        <p:spPr/>
+        <p:txBody>
+          <a:bodyPr/>
+          <a:lstStyle/>
+          <a:p>
+            <a:r>
+              <a:rPr lang="en-US" dirty="0"/>
+              <a:t>Object oriented programming principles</a:t>
+            </a:r>
+          </a:p>
+        </p:txBody>
+      </p:sp>
+      <p:sp>
+        <p:nvSpPr>
+          <p:cNvPr id="3" name="Content Placeholder 2">
+            <a:extLst>
+              <a:ext uri="{FF2B5EF4-FFF2-40B4-BE49-F238E27FC236}">
+                <a16:creationId xmlns:a16="http://schemas.microsoft.com/office/drawing/2014/main" id="{DD9D20EF-B41F-8B28-4A06-5A789A14858F}"/>
+              </a:ext>
+            </a:extLst>
+          </p:cNvPr>
+          <p:cNvSpPr>
+            <a:spLocks noGrp="1"/>
+          </p:cNvSpPr>
+          <p:nvPr>
+            <p:ph idx="1"/>
+          </p:nvPr>
+        </p:nvSpPr>
+        <p:spPr/>
+        <p:txBody>
+          <a:bodyPr>
+            <a:normAutofit/>
+          </a:bodyPr>
+          <a:lstStyle/>
+          <a:p>
+            <a:r>
+              <a:rPr lang="en-US" sz="3600" dirty="0"/>
+              <a:t>1.Abstraction</a:t>
+            </a:r>
+          </a:p>
+          <a:p>
+            <a:r>
+              <a:rPr lang="en-US" sz="3600" dirty="0"/>
+              <a:t>2.Encapsulation</a:t>
+            </a:r>
+          </a:p>
+          <a:p>
+            <a:r>
+              <a:rPr lang="en-US" sz="3600" dirty="0"/>
+              <a:t>3.Decompostion</a:t>
+            </a:r>
+          </a:p>
+          <a:p>
+            <a:r>
+              <a:rPr lang="en-US" sz="3600" dirty="0"/>
+              <a:t>4.Generalization</a:t>
+            </a:r>
+          </a:p>
+        </p:txBody>
+      </p:sp>
+    </p:spTree>
+    <p:extLst>
+      <p:ext uri="{BB962C8B-B14F-4D97-AF65-F5344CB8AC3E}">
+        <p14:creationId xmlns:p14="http://schemas.microsoft.com/office/powerpoint/2010/main" val="3219061825"/>
+      </p:ext>
+    </p:extLst>
+  </p:cSld>
+  <p:clrMapOvr>
+    <a:masterClrMapping/>
+  </p:clrMapOvr>
+</p:sld>
+</file>
+
+<file path=ppt/slides/slide18.xml><?xml version="1.0" encoding="utf-8"?>
+<p:sld xmlns:a="http://schemas.openxmlformats.org/drawingml/2006/main" xmlns:r="http://schemas.openxmlformats.org/officeDocument/2006/relationships" xmlns:p="http://schemas.openxmlformats.org/presentationml/2006/main">
+  <p:cSld>
+    <p:spTree>
+      <p:nvGrpSpPr>
+        <p:cNvPr id="1" name=""/>
+        <p:cNvGrpSpPr/>
+        <p:nvPr/>
+      </p:nvGrpSpPr>
+      <p:grpSpPr>
+        <a:xfrm>
+          <a:off x="0" y="0"/>
+          <a:ext cx="0" cy="0"/>
+          <a:chOff x="0" y="0"/>
+          <a:chExt cx="0" cy="0"/>
+        </a:xfrm>
+      </p:grpSpPr>
+      <p:sp>
+        <p:nvSpPr>
+          <p:cNvPr id="2" name="Title 1">
+            <a:extLst>
+              <a:ext uri="{FF2B5EF4-FFF2-40B4-BE49-F238E27FC236}">
+                <a16:creationId xmlns:a16="http://schemas.microsoft.com/office/drawing/2014/main" id="{80A97717-DBE6-D02E-EB49-B9722479E85F}"/>
+              </a:ext>
+            </a:extLst>
+          </p:cNvPr>
+          <p:cNvSpPr>
+            <a:spLocks noGrp="1"/>
+          </p:cNvSpPr>
+          <p:nvPr>
+            <p:ph type="title"/>
+          </p:nvPr>
+        </p:nvSpPr>
+        <p:spPr/>
+        <p:txBody>
+          <a:bodyPr/>
+          <a:lstStyle/>
+          <a:p>
+            <a:r>
+              <a:rPr lang="en-US" dirty="0"/>
+              <a:t>Abstraction</a:t>
+            </a:r>
+          </a:p>
+        </p:txBody>
+      </p:sp>
+      <p:sp>
+        <p:nvSpPr>
+          <p:cNvPr id="3" name="Content Placeholder 2">
+            <a:extLst>
+              <a:ext uri="{FF2B5EF4-FFF2-40B4-BE49-F238E27FC236}">
+                <a16:creationId xmlns:a16="http://schemas.microsoft.com/office/drawing/2014/main" id="{6520B962-7F89-7CAB-A42B-93C2697B12F7}"/>
+              </a:ext>
+            </a:extLst>
+          </p:cNvPr>
+          <p:cNvSpPr>
+            <a:spLocks noGrp="1"/>
+          </p:cNvSpPr>
+          <p:nvPr>
+            <p:ph idx="1"/>
+          </p:nvPr>
+        </p:nvSpPr>
+        <p:spPr/>
+        <p:txBody>
+          <a:bodyPr>
+            <a:normAutofit/>
+          </a:bodyPr>
+          <a:lstStyle/>
+          <a:p>
+            <a:r>
+              <a:rPr lang="en-US" sz="3200" dirty="0"/>
+              <a:t>Is simplifying concepts to its essentials within some context which allows you to focus on what’s important and ignore any unimportant details.</a:t>
+            </a:r>
+          </a:p>
+        </p:txBody>
+      </p:sp>
+    </p:spTree>
+    <p:extLst>
+      <p:ext uri="{BB962C8B-B14F-4D97-AF65-F5344CB8AC3E}">
+        <p14:creationId xmlns:p14="http://schemas.microsoft.com/office/powerpoint/2010/main" val="3631292560"/>
+      </p:ext>
+    </p:extLst>
+  </p:cSld>
+  <p:clrMapOvr>
+    <a:masterClrMapping/>
+  </p:clrMapOvr>
+</p:sld>
+</file>
+
+<file path=ppt/slides/slide19.xml><?xml version="1.0" encoding="utf-8"?>
+<p:sld xmlns:a="http://schemas.openxmlformats.org/drawingml/2006/main" xmlns:r="http://schemas.openxmlformats.org/officeDocument/2006/relationships" xmlns:p="http://schemas.openxmlformats.org/presentationml/2006/main">
+  <p:cSld>
+    <p:spTree>
+      <p:nvGrpSpPr>
+        <p:cNvPr id="1" name=""/>
+        <p:cNvGrpSpPr/>
+        <p:nvPr/>
+      </p:nvGrpSpPr>
+      <p:grpSpPr>
+        <a:xfrm>
+          <a:off x="0" y="0"/>
+          <a:ext cx="0" cy="0"/>
+          <a:chOff x="0" y="0"/>
+          <a:chExt cx="0" cy="0"/>
+        </a:xfrm>
+      </p:grpSpPr>
+      <p:sp>
+        <p:nvSpPr>
+          <p:cNvPr id="2" name="Title 1">
+            <a:extLst>
+              <a:ext uri="{FF2B5EF4-FFF2-40B4-BE49-F238E27FC236}">
+                <a16:creationId xmlns:a16="http://schemas.microsoft.com/office/drawing/2014/main" id="{F9B41990-BE3F-B974-86D3-901B9B84B680}"/>
+              </a:ext>
+            </a:extLst>
+          </p:cNvPr>
+          <p:cNvSpPr>
+            <a:spLocks noGrp="1"/>
+          </p:cNvSpPr>
+          <p:nvPr>
+            <p:ph type="title"/>
+          </p:nvPr>
+        </p:nvSpPr>
+        <p:spPr/>
+        <p:txBody>
+          <a:bodyPr/>
+          <a:lstStyle/>
+          <a:p>
+            <a:r>
+              <a:rPr lang="en-US" dirty="0"/>
+              <a:t>Encapsulation</a:t>
+            </a:r>
+          </a:p>
+        </p:txBody>
+      </p:sp>
+      <p:sp>
+        <p:nvSpPr>
+          <p:cNvPr id="3" name="Content Placeholder 2">
+            <a:extLst>
+              <a:ext uri="{FF2B5EF4-FFF2-40B4-BE49-F238E27FC236}">
+                <a16:creationId xmlns:a16="http://schemas.microsoft.com/office/drawing/2014/main" id="{5A0C42CD-324F-453F-8969-7A15F3619426}"/>
+              </a:ext>
+            </a:extLst>
+          </p:cNvPr>
+          <p:cNvSpPr>
+            <a:spLocks noGrp="1"/>
+          </p:cNvSpPr>
+          <p:nvPr>
+            <p:ph idx="1"/>
+          </p:nvPr>
+        </p:nvSpPr>
+        <p:spPr/>
+        <p:txBody>
+          <a:bodyPr/>
+          <a:lstStyle/>
+          <a:p>
+            <a:r>
+              <a:rPr lang="en-US" dirty="0"/>
+              <a:t>1.bundle attributes and behaviors associated with this data</a:t>
+            </a:r>
+          </a:p>
+          <a:p>
+            <a:r>
+              <a:rPr lang="en-US" dirty="0"/>
+              <a:t>2.expose an interface to make the outer world deal with the object</a:t>
+            </a:r>
+          </a:p>
+          <a:p>
+            <a:r>
+              <a:rPr lang="en-US" dirty="0"/>
+              <a:t>3.restrict access to certain data and behaviors</a:t>
+            </a:r>
+          </a:p>
+          <a:p>
+            <a:r>
+              <a:rPr lang="en-US" dirty="0"/>
+              <a:t>NOTE: make the class a black box and this achieves reusability.</a:t>
+            </a:r>
+          </a:p>
+          <a:p>
+            <a:r>
+              <a:rPr lang="en-US" dirty="0"/>
+              <a:t>NOTE: it achieves Data Integrity through exposing an interface in which allowed data only are accepted</a:t>
+            </a:r>
+          </a:p>
+          <a:p>
+            <a:r>
+              <a:rPr lang="en-US" dirty="0"/>
+              <a:t>NOTE: Encapsulation allows us to apply Data Hiding</a:t>
+            </a:r>
+          </a:p>
+        </p:txBody>
+      </p:sp>
+    </p:spTree>
+    <p:extLst>
+      <p:ext uri="{BB962C8B-B14F-4D97-AF65-F5344CB8AC3E}">
+        <p14:creationId xmlns:p14="http://schemas.microsoft.com/office/powerpoint/2010/main" val="3701714745"/>
+      </p:ext>
+    </p:extLst>
+  </p:cSld>
+  <p:clrMapOvr>
+    <a:masterClrMapping/>
+  </p:clrMapOvr>
+</p:sld>
+</file>
+
 <file path=ppt/slides/slide2.xml><?xml version="1.0" encoding="utf-8"?>
 <p:sld xmlns:a="http://schemas.openxmlformats.org/drawingml/2006/main" xmlns:r="http://schemas.openxmlformats.org/officeDocument/2006/relationships" xmlns:p="http://schemas.openxmlformats.org/presentationml/2006/main">
   <p:cSld>
@@ -6957,6 +7284,911 @@
     <p:extLst>
       <p:ext uri="{BB962C8B-B14F-4D97-AF65-F5344CB8AC3E}">
         <p14:creationId xmlns:p14="http://schemas.microsoft.com/office/powerpoint/2010/main" val="3929076801"/>
+      </p:ext>
+    </p:extLst>
+  </p:cSld>
+  <p:clrMapOvr>
+    <a:masterClrMapping/>
+  </p:clrMapOvr>
+</p:sld>
+</file>
+
+<file path=ppt/slides/slide20.xml><?xml version="1.0" encoding="utf-8"?>
+<p:sld xmlns:a="http://schemas.openxmlformats.org/drawingml/2006/main" xmlns:r="http://schemas.openxmlformats.org/officeDocument/2006/relationships" xmlns:p="http://schemas.openxmlformats.org/presentationml/2006/main">
+  <p:cSld>
+    <p:spTree>
+      <p:nvGrpSpPr>
+        <p:cNvPr id="1" name=""/>
+        <p:cNvGrpSpPr/>
+        <p:nvPr/>
+      </p:nvGrpSpPr>
+      <p:grpSpPr>
+        <a:xfrm>
+          <a:off x="0" y="0"/>
+          <a:ext cx="0" cy="0"/>
+          <a:chOff x="0" y="0"/>
+          <a:chExt cx="0" cy="0"/>
+        </a:xfrm>
+      </p:grpSpPr>
+      <p:sp>
+        <p:nvSpPr>
+          <p:cNvPr id="2" name="Title 1">
+            <a:extLst>
+              <a:ext uri="{FF2B5EF4-FFF2-40B4-BE49-F238E27FC236}">
+                <a16:creationId xmlns:a16="http://schemas.microsoft.com/office/drawing/2014/main" id="{8544B8C0-9B61-BCBB-20B9-6005BA1501C5}"/>
+              </a:ext>
+            </a:extLst>
+          </p:cNvPr>
+          <p:cNvSpPr>
+            <a:spLocks noGrp="1"/>
+          </p:cNvSpPr>
+          <p:nvPr>
+            <p:ph type="title"/>
+          </p:nvPr>
+        </p:nvSpPr>
+        <p:spPr/>
+        <p:txBody>
+          <a:bodyPr/>
+          <a:lstStyle/>
+          <a:p>
+            <a:r>
+              <a:rPr lang="en-US" dirty="0"/>
+              <a:t>Abstraction and encapsulation</a:t>
+            </a:r>
+          </a:p>
+        </p:txBody>
+      </p:sp>
+      <p:pic>
+        <p:nvPicPr>
+          <p:cNvPr id="5" name="Content Placeholder 4">
+            <a:extLst>
+              <a:ext uri="{FF2B5EF4-FFF2-40B4-BE49-F238E27FC236}">
+                <a16:creationId xmlns:a16="http://schemas.microsoft.com/office/drawing/2014/main" id="{CD2FE96C-4B1F-BE92-8EF5-372561CFED51}"/>
+              </a:ext>
+            </a:extLst>
+          </p:cNvPr>
+          <p:cNvPicPr>
+            <a:picLocks noGrp="1" noChangeAspect="1"/>
+          </p:cNvPicPr>
+          <p:nvPr>
+            <p:ph idx="1"/>
+          </p:nvPr>
+        </p:nvPicPr>
+        <p:blipFill>
+          <a:blip r:embed="rId2"/>
+          <a:stretch>
+            <a:fillRect/>
+          </a:stretch>
+        </p:blipFill>
+        <p:spPr>
+          <a:xfrm>
+            <a:off x="2741351" y="2335547"/>
+            <a:ext cx="6020322" cy="3261643"/>
+          </a:xfrm>
+        </p:spPr>
+      </p:pic>
+    </p:spTree>
+    <p:extLst>
+      <p:ext uri="{BB962C8B-B14F-4D97-AF65-F5344CB8AC3E}">
+        <p14:creationId xmlns:p14="http://schemas.microsoft.com/office/powerpoint/2010/main" val="2682077281"/>
+      </p:ext>
+    </p:extLst>
+  </p:cSld>
+  <p:clrMapOvr>
+    <a:masterClrMapping/>
+  </p:clrMapOvr>
+</p:sld>
+</file>
+
+<file path=ppt/slides/slide21.xml><?xml version="1.0" encoding="utf-8"?>
+<p:sld xmlns:a="http://schemas.openxmlformats.org/drawingml/2006/main" xmlns:r="http://schemas.openxmlformats.org/officeDocument/2006/relationships" xmlns:p="http://schemas.openxmlformats.org/presentationml/2006/main">
+  <p:cSld>
+    <p:spTree>
+      <p:nvGrpSpPr>
+        <p:cNvPr id="1" name=""/>
+        <p:cNvGrpSpPr/>
+        <p:nvPr/>
+      </p:nvGrpSpPr>
+      <p:grpSpPr>
+        <a:xfrm>
+          <a:off x="0" y="0"/>
+          <a:ext cx="0" cy="0"/>
+          <a:chOff x="0" y="0"/>
+          <a:chExt cx="0" cy="0"/>
+        </a:xfrm>
+      </p:grpSpPr>
+      <p:sp>
+        <p:nvSpPr>
+          <p:cNvPr id="2" name="Title 1">
+            <a:extLst>
+              <a:ext uri="{FF2B5EF4-FFF2-40B4-BE49-F238E27FC236}">
+                <a16:creationId xmlns:a16="http://schemas.microsoft.com/office/drawing/2014/main" id="{018677CC-56C7-FF7B-955A-86C5CE123233}"/>
+              </a:ext>
+            </a:extLst>
+          </p:cNvPr>
+          <p:cNvSpPr>
+            <a:spLocks noGrp="1"/>
+          </p:cNvSpPr>
+          <p:nvPr>
+            <p:ph type="title"/>
+          </p:nvPr>
+        </p:nvSpPr>
+        <p:spPr/>
+        <p:txBody>
+          <a:bodyPr/>
+          <a:lstStyle/>
+          <a:p>
+            <a:r>
+              <a:rPr lang="en-US" dirty="0"/>
+              <a:t>Decomposition</a:t>
+            </a:r>
+          </a:p>
+        </p:txBody>
+      </p:sp>
+      <p:sp>
+        <p:nvSpPr>
+          <p:cNvPr id="3" name="Content Placeholder 2">
+            <a:extLst>
+              <a:ext uri="{FF2B5EF4-FFF2-40B4-BE49-F238E27FC236}">
+                <a16:creationId xmlns:a16="http://schemas.microsoft.com/office/drawing/2014/main" id="{E189F25B-89F4-55A8-07FD-E35B87559C68}"/>
+              </a:ext>
+            </a:extLst>
+          </p:cNvPr>
+          <p:cNvSpPr>
+            <a:spLocks noGrp="1"/>
+          </p:cNvSpPr>
+          <p:nvPr>
+            <p:ph idx="1"/>
+          </p:nvPr>
+        </p:nvSpPr>
+        <p:spPr/>
+        <p:txBody>
+          <a:bodyPr>
+            <a:normAutofit/>
+          </a:bodyPr>
+          <a:lstStyle/>
+          <a:p>
+            <a:r>
+              <a:rPr lang="en-US" sz="2800" dirty="0"/>
+              <a:t>Taking a whole and dividing it into parts or on the flip side taking parts and combining them together to form a whole</a:t>
+            </a:r>
+          </a:p>
+          <a:p>
+            <a:r>
+              <a:rPr lang="en-US" sz="2800" dirty="0"/>
+              <a:t>It helps to divide a problem into subproblems that are easier to understand and solve</a:t>
+            </a:r>
+          </a:p>
+        </p:txBody>
+      </p:sp>
+    </p:spTree>
+    <p:extLst>
+      <p:ext uri="{BB962C8B-B14F-4D97-AF65-F5344CB8AC3E}">
+        <p14:creationId xmlns:p14="http://schemas.microsoft.com/office/powerpoint/2010/main" val="3956122144"/>
+      </p:ext>
+    </p:extLst>
+  </p:cSld>
+  <p:clrMapOvr>
+    <a:masterClrMapping/>
+  </p:clrMapOvr>
+</p:sld>
+</file>
+
+<file path=ppt/slides/slide22.xml><?xml version="1.0" encoding="utf-8"?>
+<p:sld xmlns:a="http://schemas.openxmlformats.org/drawingml/2006/main" xmlns:r="http://schemas.openxmlformats.org/officeDocument/2006/relationships" xmlns:p="http://schemas.openxmlformats.org/presentationml/2006/main">
+  <p:cSld>
+    <p:spTree>
+      <p:nvGrpSpPr>
+        <p:cNvPr id="1" name=""/>
+        <p:cNvGrpSpPr/>
+        <p:nvPr/>
+      </p:nvGrpSpPr>
+      <p:grpSpPr>
+        <a:xfrm>
+          <a:off x="0" y="0"/>
+          <a:ext cx="0" cy="0"/>
+          <a:chOff x="0" y="0"/>
+          <a:chExt cx="0" cy="0"/>
+        </a:xfrm>
+      </p:grpSpPr>
+      <p:sp>
+        <p:nvSpPr>
+          <p:cNvPr id="2" name="Title 1">
+            <a:extLst>
+              <a:ext uri="{FF2B5EF4-FFF2-40B4-BE49-F238E27FC236}">
+                <a16:creationId xmlns:a16="http://schemas.microsoft.com/office/drawing/2014/main" id="{A2CAEE9B-F2E9-4B44-805A-261313F880FE}"/>
+              </a:ext>
+            </a:extLst>
+          </p:cNvPr>
+          <p:cNvSpPr>
+            <a:spLocks noGrp="1"/>
+          </p:cNvSpPr>
+          <p:nvPr>
+            <p:ph type="title"/>
+          </p:nvPr>
+        </p:nvSpPr>
+        <p:spPr/>
+        <p:txBody>
+          <a:bodyPr/>
+          <a:lstStyle/>
+          <a:p>
+            <a:r>
+              <a:rPr lang="en-US" dirty="0"/>
+              <a:t>Decomposition</a:t>
+            </a:r>
+          </a:p>
+        </p:txBody>
+      </p:sp>
+      <p:sp>
+        <p:nvSpPr>
+          <p:cNvPr id="3" name="Content Placeholder 2">
+            <a:extLst>
+              <a:ext uri="{FF2B5EF4-FFF2-40B4-BE49-F238E27FC236}">
+                <a16:creationId xmlns:a16="http://schemas.microsoft.com/office/drawing/2014/main" id="{1A7B83F1-B4A3-7013-19E8-EFB07FC230A7}"/>
+              </a:ext>
+            </a:extLst>
+          </p:cNvPr>
+          <p:cNvSpPr>
+            <a:spLocks noGrp="1"/>
+          </p:cNvSpPr>
+          <p:nvPr>
+            <p:ph idx="1"/>
+          </p:nvPr>
+        </p:nvSpPr>
+        <p:spPr/>
+        <p:txBody>
+          <a:bodyPr/>
+          <a:lstStyle/>
+          <a:p>
+            <a:r>
+              <a:rPr lang="en-US" dirty="0"/>
+              <a:t>Sometimes the whole has a fixed number of parts such as the refrigerator has only 1 freezer in its entire lifetime. On the other hand, the freezer as the whole has a dynamic number of parts such as food that might change over time </a:t>
+            </a:r>
+          </a:p>
+          <a:p>
+            <a:r>
+              <a:rPr lang="en-US" dirty="0"/>
+              <a:t>Relations between these objects a whole and a part can be determined based on the lifetime of each one for example the whole and the part can exist without the other</a:t>
+            </a:r>
+          </a:p>
+          <a:p>
+            <a:r>
+              <a:rPr lang="en-US" dirty="0"/>
+              <a:t>Some parts also might be shared among other wholes</a:t>
+            </a:r>
+          </a:p>
+        </p:txBody>
+      </p:sp>
+    </p:spTree>
+    <p:extLst>
+      <p:ext uri="{BB962C8B-B14F-4D97-AF65-F5344CB8AC3E}">
+        <p14:creationId xmlns:p14="http://schemas.microsoft.com/office/powerpoint/2010/main" val="1772652045"/>
+      </p:ext>
+    </p:extLst>
+  </p:cSld>
+  <p:clrMapOvr>
+    <a:masterClrMapping/>
+  </p:clrMapOvr>
+</p:sld>
+</file>
+
+<file path=ppt/slides/slide23.xml><?xml version="1.0" encoding="utf-8"?>
+<p:sld xmlns:a="http://schemas.openxmlformats.org/drawingml/2006/main" xmlns:r="http://schemas.openxmlformats.org/officeDocument/2006/relationships" xmlns:p="http://schemas.openxmlformats.org/presentationml/2006/main">
+  <p:cSld>
+    <p:spTree>
+      <p:nvGrpSpPr>
+        <p:cNvPr id="1" name=""/>
+        <p:cNvGrpSpPr/>
+        <p:nvPr/>
+      </p:nvGrpSpPr>
+      <p:grpSpPr>
+        <a:xfrm>
+          <a:off x="0" y="0"/>
+          <a:ext cx="0" cy="0"/>
+          <a:chOff x="0" y="0"/>
+          <a:chExt cx="0" cy="0"/>
+        </a:xfrm>
+      </p:grpSpPr>
+      <p:sp>
+        <p:nvSpPr>
+          <p:cNvPr id="2" name="Title 1">
+            <a:extLst>
+              <a:ext uri="{FF2B5EF4-FFF2-40B4-BE49-F238E27FC236}">
+                <a16:creationId xmlns:a16="http://schemas.microsoft.com/office/drawing/2014/main" id="{FF821C60-3A33-4F51-D6FB-D554205D401A}"/>
+              </a:ext>
+            </a:extLst>
+          </p:cNvPr>
+          <p:cNvSpPr>
+            <a:spLocks noGrp="1"/>
+          </p:cNvSpPr>
+          <p:nvPr>
+            <p:ph type="title"/>
+          </p:nvPr>
+        </p:nvSpPr>
+        <p:spPr/>
+        <p:txBody>
+          <a:bodyPr/>
+          <a:lstStyle/>
+          <a:p>
+            <a:r>
+              <a:rPr lang="en-US" dirty="0"/>
+              <a:t>Types of decomposition</a:t>
+            </a:r>
+          </a:p>
+        </p:txBody>
+      </p:sp>
+      <p:sp>
+        <p:nvSpPr>
+          <p:cNvPr id="3" name="Content Placeholder 2">
+            <a:extLst>
+              <a:ext uri="{FF2B5EF4-FFF2-40B4-BE49-F238E27FC236}">
+                <a16:creationId xmlns:a16="http://schemas.microsoft.com/office/drawing/2014/main" id="{17C24D94-B394-351B-C865-FE5F6315EAC0}"/>
+              </a:ext>
+            </a:extLst>
+          </p:cNvPr>
+          <p:cNvSpPr>
+            <a:spLocks noGrp="1"/>
+          </p:cNvSpPr>
+          <p:nvPr>
+            <p:ph idx="1"/>
+          </p:nvPr>
+        </p:nvSpPr>
+        <p:spPr/>
+        <p:txBody>
+          <a:bodyPr>
+            <a:normAutofit/>
+          </a:bodyPr>
+          <a:lstStyle/>
+          <a:p>
+            <a:r>
+              <a:rPr lang="en-US" sz="3200" dirty="0"/>
+              <a:t>Association</a:t>
+            </a:r>
+          </a:p>
+          <a:p>
+            <a:r>
+              <a:rPr lang="en-US" sz="3200" dirty="0"/>
+              <a:t>Aggregation</a:t>
+            </a:r>
+          </a:p>
+          <a:p>
+            <a:r>
+              <a:rPr lang="en-US" sz="3200" dirty="0"/>
+              <a:t>Composition</a:t>
+            </a:r>
+          </a:p>
+        </p:txBody>
+      </p:sp>
+    </p:spTree>
+    <p:extLst>
+      <p:ext uri="{BB962C8B-B14F-4D97-AF65-F5344CB8AC3E}">
+        <p14:creationId xmlns:p14="http://schemas.microsoft.com/office/powerpoint/2010/main" val="3233335460"/>
+      </p:ext>
+    </p:extLst>
+  </p:cSld>
+  <p:clrMapOvr>
+    <a:masterClrMapping/>
+  </p:clrMapOvr>
+</p:sld>
+</file>
+
+<file path=ppt/slides/slide24.xml><?xml version="1.0" encoding="utf-8"?>
+<p:sld xmlns:a="http://schemas.openxmlformats.org/drawingml/2006/main" xmlns:r="http://schemas.openxmlformats.org/officeDocument/2006/relationships" xmlns:p="http://schemas.openxmlformats.org/presentationml/2006/main">
+  <p:cSld>
+    <p:spTree>
+      <p:nvGrpSpPr>
+        <p:cNvPr id="1" name=""/>
+        <p:cNvGrpSpPr/>
+        <p:nvPr/>
+      </p:nvGrpSpPr>
+      <p:grpSpPr>
+        <a:xfrm>
+          <a:off x="0" y="0"/>
+          <a:ext cx="0" cy="0"/>
+          <a:chOff x="0" y="0"/>
+          <a:chExt cx="0" cy="0"/>
+        </a:xfrm>
+      </p:grpSpPr>
+      <p:sp>
+        <p:nvSpPr>
+          <p:cNvPr id="2" name="Title 1">
+            <a:extLst>
+              <a:ext uri="{FF2B5EF4-FFF2-40B4-BE49-F238E27FC236}">
+                <a16:creationId xmlns:a16="http://schemas.microsoft.com/office/drawing/2014/main" id="{D35AD425-BF14-154D-39DA-D70B6E61CAC2}"/>
+              </a:ext>
+            </a:extLst>
+          </p:cNvPr>
+          <p:cNvSpPr>
+            <a:spLocks noGrp="1"/>
+          </p:cNvSpPr>
+          <p:nvPr>
+            <p:ph type="title"/>
+          </p:nvPr>
+        </p:nvSpPr>
+        <p:spPr/>
+        <p:txBody>
+          <a:bodyPr/>
+          <a:lstStyle/>
+          <a:p>
+            <a:r>
+              <a:rPr lang="en-US" dirty="0"/>
+              <a:t>Association</a:t>
+            </a:r>
+          </a:p>
+        </p:txBody>
+      </p:sp>
+      <p:sp>
+        <p:nvSpPr>
+          <p:cNvPr id="3" name="Content Placeholder 2">
+            <a:extLst>
+              <a:ext uri="{FF2B5EF4-FFF2-40B4-BE49-F238E27FC236}">
+                <a16:creationId xmlns:a16="http://schemas.microsoft.com/office/drawing/2014/main" id="{97F38ADD-B50B-BEDF-030A-ED1689A12A59}"/>
+              </a:ext>
+            </a:extLst>
+          </p:cNvPr>
+          <p:cNvSpPr>
+            <a:spLocks noGrp="1"/>
+          </p:cNvSpPr>
+          <p:nvPr>
+            <p:ph idx="1"/>
+          </p:nvPr>
+        </p:nvSpPr>
+        <p:spPr/>
+        <p:txBody>
+          <a:bodyPr>
+            <a:normAutofit/>
+          </a:bodyPr>
+          <a:lstStyle/>
+          <a:p>
+            <a:r>
+              <a:rPr lang="en-US" sz="3200" dirty="0"/>
+              <a:t>Is loose relationship between two objects that will interact with each other at some point of time but both objects can live without each other.</a:t>
+            </a:r>
+          </a:p>
+        </p:txBody>
+      </p:sp>
+    </p:spTree>
+    <p:extLst>
+      <p:ext uri="{BB962C8B-B14F-4D97-AF65-F5344CB8AC3E}">
+        <p14:creationId xmlns:p14="http://schemas.microsoft.com/office/powerpoint/2010/main" val="2191140996"/>
+      </p:ext>
+    </p:extLst>
+  </p:cSld>
+  <p:clrMapOvr>
+    <a:masterClrMapping/>
+  </p:clrMapOvr>
+</p:sld>
+</file>
+
+<file path=ppt/slides/slide25.xml><?xml version="1.0" encoding="utf-8"?>
+<p:sld xmlns:a="http://schemas.openxmlformats.org/drawingml/2006/main" xmlns:r="http://schemas.openxmlformats.org/officeDocument/2006/relationships" xmlns:p="http://schemas.openxmlformats.org/presentationml/2006/main">
+  <p:cSld>
+    <p:spTree>
+      <p:nvGrpSpPr>
+        <p:cNvPr id="1" name=""/>
+        <p:cNvGrpSpPr/>
+        <p:nvPr/>
+      </p:nvGrpSpPr>
+      <p:grpSpPr>
+        <a:xfrm>
+          <a:off x="0" y="0"/>
+          <a:ext cx="0" cy="0"/>
+          <a:chOff x="0" y="0"/>
+          <a:chExt cx="0" cy="0"/>
+        </a:xfrm>
+      </p:grpSpPr>
+      <p:sp>
+        <p:nvSpPr>
+          <p:cNvPr id="2" name="Title 1">
+            <a:extLst>
+              <a:ext uri="{FF2B5EF4-FFF2-40B4-BE49-F238E27FC236}">
+                <a16:creationId xmlns:a16="http://schemas.microsoft.com/office/drawing/2014/main" id="{804D7332-C77F-769C-66D5-857EA9F8685C}"/>
+              </a:ext>
+            </a:extLst>
+          </p:cNvPr>
+          <p:cNvSpPr>
+            <a:spLocks noGrp="1"/>
+          </p:cNvSpPr>
+          <p:nvPr>
+            <p:ph type="title"/>
+          </p:nvPr>
+        </p:nvSpPr>
+        <p:spPr/>
+        <p:txBody>
+          <a:bodyPr/>
+          <a:lstStyle/>
+          <a:p>
+            <a:r>
+              <a:rPr lang="en-US" dirty="0"/>
+              <a:t>Association in UML</a:t>
+            </a:r>
+          </a:p>
+        </p:txBody>
+      </p:sp>
+      <p:pic>
+        <p:nvPicPr>
+          <p:cNvPr id="5" name="Content Placeholder 4">
+            <a:extLst>
+              <a:ext uri="{FF2B5EF4-FFF2-40B4-BE49-F238E27FC236}">
+                <a16:creationId xmlns:a16="http://schemas.microsoft.com/office/drawing/2014/main" id="{78297379-2A76-11DD-BDD0-3F0B9CE99DD2}"/>
+              </a:ext>
+            </a:extLst>
+          </p:cNvPr>
+          <p:cNvPicPr>
+            <a:picLocks noGrp="1" noChangeAspect="1"/>
+          </p:cNvPicPr>
+          <p:nvPr>
+            <p:ph idx="1"/>
+          </p:nvPr>
+        </p:nvPicPr>
+        <p:blipFill>
+          <a:blip r:embed="rId2"/>
+          <a:stretch>
+            <a:fillRect/>
+          </a:stretch>
+        </p:blipFill>
+        <p:spPr>
+          <a:xfrm>
+            <a:off x="2166724" y="2141538"/>
+            <a:ext cx="7169576" cy="3649662"/>
+          </a:xfrm>
+        </p:spPr>
+      </p:pic>
+    </p:spTree>
+    <p:extLst>
+      <p:ext uri="{BB962C8B-B14F-4D97-AF65-F5344CB8AC3E}">
+        <p14:creationId xmlns:p14="http://schemas.microsoft.com/office/powerpoint/2010/main" val="1026154750"/>
+      </p:ext>
+    </p:extLst>
+  </p:cSld>
+  <p:clrMapOvr>
+    <a:masterClrMapping/>
+  </p:clrMapOvr>
+</p:sld>
+</file>
+
+<file path=ppt/slides/slide26.xml><?xml version="1.0" encoding="utf-8"?>
+<p:sld xmlns:a="http://schemas.openxmlformats.org/drawingml/2006/main" xmlns:r="http://schemas.openxmlformats.org/officeDocument/2006/relationships" xmlns:p="http://schemas.openxmlformats.org/presentationml/2006/main">
+  <p:cSld>
+    <p:spTree>
+      <p:nvGrpSpPr>
+        <p:cNvPr id="1" name=""/>
+        <p:cNvGrpSpPr/>
+        <p:nvPr/>
+      </p:nvGrpSpPr>
+      <p:grpSpPr>
+        <a:xfrm>
+          <a:off x="0" y="0"/>
+          <a:ext cx="0" cy="0"/>
+          <a:chOff x="0" y="0"/>
+          <a:chExt cx="0" cy="0"/>
+        </a:xfrm>
+      </p:grpSpPr>
+      <p:sp>
+        <p:nvSpPr>
+          <p:cNvPr id="2" name="Title 1">
+            <a:extLst>
+              <a:ext uri="{FF2B5EF4-FFF2-40B4-BE49-F238E27FC236}">
+                <a16:creationId xmlns:a16="http://schemas.microsoft.com/office/drawing/2014/main" id="{E8BB947B-D4DC-F128-D13D-38AB5493F022}"/>
+              </a:ext>
+            </a:extLst>
+          </p:cNvPr>
+          <p:cNvSpPr>
+            <a:spLocks noGrp="1"/>
+          </p:cNvSpPr>
+          <p:nvPr>
+            <p:ph type="title"/>
+          </p:nvPr>
+        </p:nvSpPr>
+        <p:spPr/>
+        <p:txBody>
+          <a:bodyPr/>
+          <a:lstStyle/>
+          <a:p>
+            <a:r>
+              <a:rPr lang="en-AU" dirty="0"/>
+              <a:t>Association in Code</a:t>
+            </a:r>
+            <a:endParaRPr lang="en-US" dirty="0"/>
+          </a:p>
+        </p:txBody>
+      </p:sp>
+      <p:pic>
+        <p:nvPicPr>
+          <p:cNvPr id="5" name="Content Placeholder 4">
+            <a:extLst>
+              <a:ext uri="{FF2B5EF4-FFF2-40B4-BE49-F238E27FC236}">
+                <a16:creationId xmlns:a16="http://schemas.microsoft.com/office/drawing/2014/main" id="{669961DB-A35E-9E98-C6A5-EAC63E9BB9D9}"/>
+              </a:ext>
+            </a:extLst>
+          </p:cNvPr>
+          <p:cNvPicPr>
+            <a:picLocks noGrp="1" noChangeAspect="1"/>
+          </p:cNvPicPr>
+          <p:nvPr>
+            <p:ph idx="1"/>
+          </p:nvPr>
+        </p:nvPicPr>
+        <p:blipFill>
+          <a:blip r:embed="rId2"/>
+          <a:stretch>
+            <a:fillRect/>
+          </a:stretch>
+        </p:blipFill>
+        <p:spPr>
+          <a:xfrm>
+            <a:off x="2684196" y="2834701"/>
+            <a:ext cx="6134632" cy="2263336"/>
+          </a:xfrm>
+        </p:spPr>
+      </p:pic>
+    </p:spTree>
+    <p:extLst>
+      <p:ext uri="{BB962C8B-B14F-4D97-AF65-F5344CB8AC3E}">
+        <p14:creationId xmlns:p14="http://schemas.microsoft.com/office/powerpoint/2010/main" val="1812416278"/>
+      </p:ext>
+    </p:extLst>
+  </p:cSld>
+  <p:clrMapOvr>
+    <a:masterClrMapping/>
+  </p:clrMapOvr>
+</p:sld>
+</file>
+
+<file path=ppt/slides/slide27.xml><?xml version="1.0" encoding="utf-8"?>
+<p:sld xmlns:a="http://schemas.openxmlformats.org/drawingml/2006/main" xmlns:r="http://schemas.openxmlformats.org/officeDocument/2006/relationships" xmlns:p="http://schemas.openxmlformats.org/presentationml/2006/main">
+  <p:cSld>
+    <p:spTree>
+      <p:nvGrpSpPr>
+        <p:cNvPr id="1" name=""/>
+        <p:cNvGrpSpPr/>
+        <p:nvPr/>
+      </p:nvGrpSpPr>
+      <p:grpSpPr>
+        <a:xfrm>
+          <a:off x="0" y="0"/>
+          <a:ext cx="0" cy="0"/>
+          <a:chOff x="0" y="0"/>
+          <a:chExt cx="0" cy="0"/>
+        </a:xfrm>
+      </p:grpSpPr>
+      <p:sp>
+        <p:nvSpPr>
+          <p:cNvPr id="2" name="Title 1">
+            <a:extLst>
+              <a:ext uri="{FF2B5EF4-FFF2-40B4-BE49-F238E27FC236}">
+                <a16:creationId xmlns:a16="http://schemas.microsoft.com/office/drawing/2014/main" id="{93EEA601-48C5-7311-411E-D019A52F216F}"/>
+              </a:ext>
+            </a:extLst>
+          </p:cNvPr>
+          <p:cNvSpPr>
+            <a:spLocks noGrp="1"/>
+          </p:cNvSpPr>
+          <p:nvPr>
+            <p:ph type="title"/>
+          </p:nvPr>
+        </p:nvSpPr>
+        <p:spPr/>
+        <p:txBody>
+          <a:bodyPr/>
+          <a:lstStyle/>
+          <a:p>
+            <a:r>
+              <a:rPr lang="en-US" dirty="0"/>
+              <a:t>Aggregation	</a:t>
+            </a:r>
+          </a:p>
+        </p:txBody>
+      </p:sp>
+      <p:sp>
+        <p:nvSpPr>
+          <p:cNvPr id="3" name="Content Placeholder 2">
+            <a:extLst>
+              <a:ext uri="{FF2B5EF4-FFF2-40B4-BE49-F238E27FC236}">
+                <a16:creationId xmlns:a16="http://schemas.microsoft.com/office/drawing/2014/main" id="{0501777E-19FA-2EB9-4265-6B37C3683E61}"/>
+              </a:ext>
+            </a:extLst>
+          </p:cNvPr>
+          <p:cNvSpPr>
+            <a:spLocks noGrp="1"/>
+          </p:cNvSpPr>
+          <p:nvPr>
+            <p:ph idx="1"/>
+          </p:nvPr>
+        </p:nvSpPr>
+        <p:spPr/>
+        <p:txBody>
+          <a:bodyPr>
+            <a:normAutofit/>
+          </a:bodyPr>
+          <a:lstStyle/>
+          <a:p>
+            <a:r>
+              <a:rPr lang="en-US" sz="2800" dirty="0"/>
+              <a:t>Is a “has a” relationship between a part and a whole but it’s considered weak because both part does not cease to exist without one another.</a:t>
+            </a:r>
+          </a:p>
+        </p:txBody>
+      </p:sp>
+    </p:spTree>
+    <p:extLst>
+      <p:ext uri="{BB962C8B-B14F-4D97-AF65-F5344CB8AC3E}">
+        <p14:creationId xmlns:p14="http://schemas.microsoft.com/office/powerpoint/2010/main" val="4109947763"/>
+      </p:ext>
+    </p:extLst>
+  </p:cSld>
+  <p:clrMapOvr>
+    <a:masterClrMapping/>
+  </p:clrMapOvr>
+</p:sld>
+</file>
+
+<file path=ppt/slides/slide28.xml><?xml version="1.0" encoding="utf-8"?>
+<p:sld xmlns:a="http://schemas.openxmlformats.org/drawingml/2006/main" xmlns:r="http://schemas.openxmlformats.org/officeDocument/2006/relationships" xmlns:p="http://schemas.openxmlformats.org/presentationml/2006/main">
+  <p:cSld>
+    <p:spTree>
+      <p:nvGrpSpPr>
+        <p:cNvPr id="1" name=""/>
+        <p:cNvGrpSpPr/>
+        <p:nvPr/>
+      </p:nvGrpSpPr>
+      <p:grpSpPr>
+        <a:xfrm>
+          <a:off x="0" y="0"/>
+          <a:ext cx="0" cy="0"/>
+          <a:chOff x="0" y="0"/>
+          <a:chExt cx="0" cy="0"/>
+        </a:xfrm>
+      </p:grpSpPr>
+      <p:sp>
+        <p:nvSpPr>
+          <p:cNvPr id="2" name="Title 1">
+            <a:extLst>
+              <a:ext uri="{FF2B5EF4-FFF2-40B4-BE49-F238E27FC236}">
+                <a16:creationId xmlns:a16="http://schemas.microsoft.com/office/drawing/2014/main" id="{C5951C77-9C43-0E2B-4FB5-C4CE8E282FCA}"/>
+              </a:ext>
+            </a:extLst>
+          </p:cNvPr>
+          <p:cNvSpPr>
+            <a:spLocks noGrp="1"/>
+          </p:cNvSpPr>
+          <p:nvPr>
+            <p:ph type="title"/>
+          </p:nvPr>
+        </p:nvSpPr>
+        <p:spPr/>
+        <p:txBody>
+          <a:bodyPr/>
+          <a:lstStyle/>
+          <a:p>
+            <a:r>
+              <a:rPr lang="en-US" dirty="0"/>
+              <a:t>Aggregation in UML</a:t>
+            </a:r>
+          </a:p>
+        </p:txBody>
+      </p:sp>
+      <p:pic>
+        <p:nvPicPr>
+          <p:cNvPr id="5" name="Content Placeholder 4">
+            <a:extLst>
+              <a:ext uri="{FF2B5EF4-FFF2-40B4-BE49-F238E27FC236}">
+                <a16:creationId xmlns:a16="http://schemas.microsoft.com/office/drawing/2014/main" id="{2D8C8D9D-AEBA-9081-2B2D-56B2375D225E}"/>
+              </a:ext>
+            </a:extLst>
+          </p:cNvPr>
+          <p:cNvPicPr>
+            <a:picLocks noGrp="1" noChangeAspect="1"/>
+          </p:cNvPicPr>
+          <p:nvPr>
+            <p:ph idx="1"/>
+          </p:nvPr>
+        </p:nvPicPr>
+        <p:blipFill>
+          <a:blip r:embed="rId2"/>
+          <a:stretch>
+            <a:fillRect/>
+          </a:stretch>
+        </p:blipFill>
+        <p:spPr>
+          <a:xfrm>
+            <a:off x="2193929" y="2141538"/>
+            <a:ext cx="7115166" cy="3649662"/>
+          </a:xfrm>
+        </p:spPr>
+      </p:pic>
+    </p:spTree>
+    <p:extLst>
+      <p:ext uri="{BB962C8B-B14F-4D97-AF65-F5344CB8AC3E}">
+        <p14:creationId xmlns:p14="http://schemas.microsoft.com/office/powerpoint/2010/main" val="3626028481"/>
+      </p:ext>
+    </p:extLst>
+  </p:cSld>
+  <p:clrMapOvr>
+    <a:masterClrMapping/>
+  </p:clrMapOvr>
+</p:sld>
+</file>
+
+<file path=ppt/slides/slide29.xml><?xml version="1.0" encoding="utf-8"?>
+<p:sld xmlns:a="http://schemas.openxmlformats.org/drawingml/2006/main" xmlns:r="http://schemas.openxmlformats.org/officeDocument/2006/relationships" xmlns:p="http://schemas.openxmlformats.org/presentationml/2006/main">
+  <p:cSld>
+    <p:spTree>
+      <p:nvGrpSpPr>
+        <p:cNvPr id="1" name=""/>
+        <p:cNvGrpSpPr/>
+        <p:nvPr/>
+      </p:nvGrpSpPr>
+      <p:grpSpPr>
+        <a:xfrm>
+          <a:off x="0" y="0"/>
+          <a:ext cx="0" cy="0"/>
+          <a:chOff x="0" y="0"/>
+          <a:chExt cx="0" cy="0"/>
+        </a:xfrm>
+      </p:grpSpPr>
+      <p:sp>
+        <p:nvSpPr>
+          <p:cNvPr id="2" name="Title 1">
+            <a:extLst>
+              <a:ext uri="{FF2B5EF4-FFF2-40B4-BE49-F238E27FC236}">
+                <a16:creationId xmlns:a16="http://schemas.microsoft.com/office/drawing/2014/main" id="{1E843B51-58F4-CBD0-9128-02C75E4C0E7A}"/>
+              </a:ext>
+            </a:extLst>
+          </p:cNvPr>
+          <p:cNvSpPr>
+            <a:spLocks noGrp="1"/>
+          </p:cNvSpPr>
+          <p:nvPr>
+            <p:ph type="title"/>
+          </p:nvPr>
+        </p:nvSpPr>
+        <p:spPr/>
+        <p:txBody>
+          <a:bodyPr/>
+          <a:lstStyle/>
+          <a:p>
+            <a:r>
+              <a:rPr lang="en-AU" dirty="0"/>
+              <a:t>Aggregation in code</a:t>
+            </a:r>
+            <a:endParaRPr lang="en-US" dirty="0"/>
+          </a:p>
+        </p:txBody>
+      </p:sp>
+      <p:pic>
+        <p:nvPicPr>
+          <p:cNvPr id="5" name="Content Placeholder 4">
+            <a:extLst>
+              <a:ext uri="{FF2B5EF4-FFF2-40B4-BE49-F238E27FC236}">
+                <a16:creationId xmlns:a16="http://schemas.microsoft.com/office/drawing/2014/main" id="{1D4AC530-9D4C-93DA-9871-CBB918206EEC}"/>
+              </a:ext>
+            </a:extLst>
+          </p:cNvPr>
+          <p:cNvPicPr>
+            <a:picLocks noGrp="1" noChangeAspect="1"/>
+          </p:cNvPicPr>
+          <p:nvPr>
+            <p:ph idx="1"/>
+          </p:nvPr>
+        </p:nvPicPr>
+        <p:blipFill>
+          <a:blip r:embed="rId2"/>
+          <a:stretch>
+            <a:fillRect/>
+          </a:stretch>
+        </p:blipFill>
+        <p:spPr>
+          <a:xfrm>
+            <a:off x="2661334" y="2350789"/>
+            <a:ext cx="6180356" cy="3231160"/>
+          </a:xfrm>
+        </p:spPr>
+      </p:pic>
+    </p:spTree>
+    <p:extLst>
+      <p:ext uri="{BB962C8B-B14F-4D97-AF65-F5344CB8AC3E}">
+        <p14:creationId xmlns:p14="http://schemas.microsoft.com/office/powerpoint/2010/main" val="1263281480"/>
       </p:ext>
     </p:extLst>
   </p:cSld>
@@ -7064,6 +8296,372 @@
     <p:extLst>
       <p:ext uri="{BB962C8B-B14F-4D97-AF65-F5344CB8AC3E}">
         <p14:creationId xmlns:p14="http://schemas.microsoft.com/office/powerpoint/2010/main" val="1046804220"/>
+      </p:ext>
+    </p:extLst>
+  </p:cSld>
+  <p:clrMapOvr>
+    <a:masterClrMapping/>
+  </p:clrMapOvr>
+</p:sld>
+</file>
+
+<file path=ppt/slides/slide30.xml><?xml version="1.0" encoding="utf-8"?>
+<p:sld xmlns:a="http://schemas.openxmlformats.org/drawingml/2006/main" xmlns:r="http://schemas.openxmlformats.org/officeDocument/2006/relationships" xmlns:p="http://schemas.openxmlformats.org/presentationml/2006/main">
+  <p:cSld>
+    <p:spTree>
+      <p:nvGrpSpPr>
+        <p:cNvPr id="1" name=""/>
+        <p:cNvGrpSpPr/>
+        <p:nvPr/>
+      </p:nvGrpSpPr>
+      <p:grpSpPr>
+        <a:xfrm>
+          <a:off x="0" y="0"/>
+          <a:ext cx="0" cy="0"/>
+          <a:chOff x="0" y="0"/>
+          <a:chExt cx="0" cy="0"/>
+        </a:xfrm>
+      </p:grpSpPr>
+      <p:sp>
+        <p:nvSpPr>
+          <p:cNvPr id="2" name="Title 1">
+            <a:extLst>
+              <a:ext uri="{FF2B5EF4-FFF2-40B4-BE49-F238E27FC236}">
+                <a16:creationId xmlns:a16="http://schemas.microsoft.com/office/drawing/2014/main" id="{24DD9262-40E7-16E2-9AEA-936D9EB0080C}"/>
+              </a:ext>
+            </a:extLst>
+          </p:cNvPr>
+          <p:cNvSpPr>
+            <a:spLocks noGrp="1"/>
+          </p:cNvSpPr>
+          <p:nvPr>
+            <p:ph type="title"/>
+          </p:nvPr>
+        </p:nvSpPr>
+        <p:spPr/>
+        <p:txBody>
+          <a:bodyPr/>
+          <a:lstStyle/>
+          <a:p>
+            <a:r>
+              <a:rPr lang="en-US" dirty="0"/>
+              <a:t>Composition</a:t>
+            </a:r>
+          </a:p>
+        </p:txBody>
+      </p:sp>
+      <p:sp>
+        <p:nvSpPr>
+          <p:cNvPr id="3" name="Content Placeholder 2">
+            <a:extLst>
+              <a:ext uri="{FF2B5EF4-FFF2-40B4-BE49-F238E27FC236}">
+                <a16:creationId xmlns:a16="http://schemas.microsoft.com/office/drawing/2014/main" id="{4563DB5F-0748-5CED-704D-9DE521350173}"/>
+              </a:ext>
+            </a:extLst>
+          </p:cNvPr>
+          <p:cNvSpPr>
+            <a:spLocks noGrp="1"/>
+          </p:cNvSpPr>
+          <p:nvPr>
+            <p:ph idx="1"/>
+          </p:nvPr>
+        </p:nvSpPr>
+        <p:spPr/>
+        <p:txBody>
+          <a:bodyPr>
+            <a:normAutofit/>
+          </a:bodyPr>
+          <a:lstStyle/>
+          <a:p>
+            <a:r>
+              <a:rPr lang="en-US" sz="3200" dirty="0"/>
+              <a:t>Is a strong “has a” relationship between a whole and its parts the whole cease to exist without the parts and vice versa.</a:t>
+            </a:r>
+          </a:p>
+        </p:txBody>
+      </p:sp>
+    </p:spTree>
+    <p:extLst>
+      <p:ext uri="{BB962C8B-B14F-4D97-AF65-F5344CB8AC3E}">
+        <p14:creationId xmlns:p14="http://schemas.microsoft.com/office/powerpoint/2010/main" val="3243629281"/>
+      </p:ext>
+    </p:extLst>
+  </p:cSld>
+  <p:clrMapOvr>
+    <a:masterClrMapping/>
+  </p:clrMapOvr>
+</p:sld>
+</file>
+
+<file path=ppt/slides/slide31.xml><?xml version="1.0" encoding="utf-8"?>
+<p:sld xmlns:a="http://schemas.openxmlformats.org/drawingml/2006/main" xmlns:r="http://schemas.openxmlformats.org/officeDocument/2006/relationships" xmlns:p="http://schemas.openxmlformats.org/presentationml/2006/main">
+  <p:cSld>
+    <p:spTree>
+      <p:nvGrpSpPr>
+        <p:cNvPr id="1" name=""/>
+        <p:cNvGrpSpPr/>
+        <p:nvPr/>
+      </p:nvGrpSpPr>
+      <p:grpSpPr>
+        <a:xfrm>
+          <a:off x="0" y="0"/>
+          <a:ext cx="0" cy="0"/>
+          <a:chOff x="0" y="0"/>
+          <a:chExt cx="0" cy="0"/>
+        </a:xfrm>
+      </p:grpSpPr>
+      <p:sp>
+        <p:nvSpPr>
+          <p:cNvPr id="2" name="Title 1">
+            <a:extLst>
+              <a:ext uri="{FF2B5EF4-FFF2-40B4-BE49-F238E27FC236}">
+                <a16:creationId xmlns:a16="http://schemas.microsoft.com/office/drawing/2014/main" id="{04BAC52B-297B-8DA3-A7A4-96CAB6AF6F64}"/>
+              </a:ext>
+            </a:extLst>
+          </p:cNvPr>
+          <p:cNvSpPr>
+            <a:spLocks noGrp="1"/>
+          </p:cNvSpPr>
+          <p:nvPr>
+            <p:ph type="title"/>
+          </p:nvPr>
+        </p:nvSpPr>
+        <p:spPr/>
+        <p:txBody>
+          <a:bodyPr/>
+          <a:lstStyle/>
+          <a:p>
+            <a:r>
+              <a:rPr lang="en-US" dirty="0"/>
+              <a:t>Composition in UML</a:t>
+            </a:r>
+          </a:p>
+        </p:txBody>
+      </p:sp>
+      <p:pic>
+        <p:nvPicPr>
+          <p:cNvPr id="5" name="Content Placeholder 4">
+            <a:extLst>
+              <a:ext uri="{FF2B5EF4-FFF2-40B4-BE49-F238E27FC236}">
+                <a16:creationId xmlns:a16="http://schemas.microsoft.com/office/drawing/2014/main" id="{408D83B3-6E92-0AE6-7B98-29E9DB8C4BBB}"/>
+              </a:ext>
+            </a:extLst>
+          </p:cNvPr>
+          <p:cNvPicPr>
+            <a:picLocks noGrp="1" noChangeAspect="1"/>
+          </p:cNvPicPr>
+          <p:nvPr>
+            <p:ph idx="1"/>
+          </p:nvPr>
+        </p:nvPicPr>
+        <p:blipFill>
+          <a:blip r:embed="rId2"/>
+          <a:stretch>
+            <a:fillRect/>
+          </a:stretch>
+        </p:blipFill>
+        <p:spPr>
+          <a:xfrm>
+            <a:off x="2381840" y="2141538"/>
+            <a:ext cx="6739344" cy="3649662"/>
+          </a:xfrm>
+        </p:spPr>
+      </p:pic>
+    </p:spTree>
+    <p:extLst>
+      <p:ext uri="{BB962C8B-B14F-4D97-AF65-F5344CB8AC3E}">
+        <p14:creationId xmlns:p14="http://schemas.microsoft.com/office/powerpoint/2010/main" val="4002543083"/>
+      </p:ext>
+    </p:extLst>
+  </p:cSld>
+  <p:clrMapOvr>
+    <a:masterClrMapping/>
+  </p:clrMapOvr>
+</p:sld>
+</file>
+
+<file path=ppt/slides/slide32.xml><?xml version="1.0" encoding="utf-8"?>
+<p:sld xmlns:a="http://schemas.openxmlformats.org/drawingml/2006/main" xmlns:r="http://schemas.openxmlformats.org/officeDocument/2006/relationships" xmlns:p="http://schemas.openxmlformats.org/presentationml/2006/main">
+  <p:cSld>
+    <p:spTree>
+      <p:nvGrpSpPr>
+        <p:cNvPr id="1" name=""/>
+        <p:cNvGrpSpPr/>
+        <p:nvPr/>
+      </p:nvGrpSpPr>
+      <p:grpSpPr>
+        <a:xfrm>
+          <a:off x="0" y="0"/>
+          <a:ext cx="0" cy="0"/>
+          <a:chOff x="0" y="0"/>
+          <a:chExt cx="0" cy="0"/>
+        </a:xfrm>
+      </p:grpSpPr>
+      <p:sp>
+        <p:nvSpPr>
+          <p:cNvPr id="2" name="Title 1">
+            <a:extLst>
+              <a:ext uri="{FF2B5EF4-FFF2-40B4-BE49-F238E27FC236}">
+                <a16:creationId xmlns:a16="http://schemas.microsoft.com/office/drawing/2014/main" id="{829EF3E9-63D1-3C02-9997-B8EEC6A29D49}"/>
+              </a:ext>
+            </a:extLst>
+          </p:cNvPr>
+          <p:cNvSpPr>
+            <a:spLocks noGrp="1"/>
+          </p:cNvSpPr>
+          <p:nvPr>
+            <p:ph type="title"/>
+          </p:nvPr>
+        </p:nvSpPr>
+        <p:spPr/>
+        <p:txBody>
+          <a:bodyPr/>
+          <a:lstStyle/>
+          <a:p>
+            <a:r>
+              <a:rPr lang="en-AU" dirty="0"/>
+              <a:t>Composition in Code</a:t>
+            </a:r>
+            <a:endParaRPr lang="en-US" dirty="0"/>
+          </a:p>
+        </p:txBody>
+      </p:sp>
+      <p:pic>
+        <p:nvPicPr>
+          <p:cNvPr id="5" name="Content Placeholder 4">
+            <a:extLst>
+              <a:ext uri="{FF2B5EF4-FFF2-40B4-BE49-F238E27FC236}">
+                <a16:creationId xmlns:a16="http://schemas.microsoft.com/office/drawing/2014/main" id="{5D398B44-25FD-B2E9-3397-F779D92D097E}"/>
+              </a:ext>
+            </a:extLst>
+          </p:cNvPr>
+          <p:cNvPicPr>
+            <a:picLocks noGrp="1" noChangeAspect="1"/>
+          </p:cNvPicPr>
+          <p:nvPr>
+            <p:ph idx="1"/>
+          </p:nvPr>
+        </p:nvPicPr>
+        <p:blipFill>
+          <a:blip r:embed="rId2"/>
+          <a:stretch>
+            <a:fillRect/>
+          </a:stretch>
+        </p:blipFill>
+        <p:spPr>
+          <a:xfrm>
+            <a:off x="685801" y="2551699"/>
+            <a:ext cx="10998683" cy="3032673"/>
+          </a:xfrm>
+        </p:spPr>
+      </p:pic>
+    </p:spTree>
+    <p:extLst>
+      <p:ext uri="{BB962C8B-B14F-4D97-AF65-F5344CB8AC3E}">
+        <p14:creationId xmlns:p14="http://schemas.microsoft.com/office/powerpoint/2010/main" val="2964905434"/>
+      </p:ext>
+    </p:extLst>
+  </p:cSld>
+  <p:clrMapOvr>
+    <a:masterClrMapping/>
+  </p:clrMapOvr>
+</p:sld>
+</file>
+
+<file path=ppt/slides/slide33.xml><?xml version="1.0" encoding="utf-8"?>
+<p:sld xmlns:a="http://schemas.openxmlformats.org/drawingml/2006/main" xmlns:r="http://schemas.openxmlformats.org/officeDocument/2006/relationships" xmlns:p="http://schemas.openxmlformats.org/presentationml/2006/main">
+  <p:cSld>
+    <p:spTree>
+      <p:nvGrpSpPr>
+        <p:cNvPr id="1" name=""/>
+        <p:cNvGrpSpPr/>
+        <p:nvPr/>
+      </p:nvGrpSpPr>
+      <p:grpSpPr>
+        <a:xfrm>
+          <a:off x="0" y="0"/>
+          <a:ext cx="0" cy="0"/>
+          <a:chOff x="0" y="0"/>
+          <a:chExt cx="0" cy="0"/>
+        </a:xfrm>
+      </p:grpSpPr>
+      <p:sp>
+        <p:nvSpPr>
+          <p:cNvPr id="2" name="Title 1">
+            <a:extLst>
+              <a:ext uri="{FF2B5EF4-FFF2-40B4-BE49-F238E27FC236}">
+                <a16:creationId xmlns:a16="http://schemas.microsoft.com/office/drawing/2014/main" id="{8D342EA2-EB38-A9C8-C667-9777BDF17C4D}"/>
+              </a:ext>
+            </a:extLst>
+          </p:cNvPr>
+          <p:cNvSpPr>
+            <a:spLocks noGrp="1"/>
+          </p:cNvSpPr>
+          <p:nvPr>
+            <p:ph type="title"/>
+          </p:nvPr>
+        </p:nvSpPr>
+        <p:spPr/>
+        <p:txBody>
+          <a:bodyPr/>
+          <a:lstStyle/>
+          <a:p>
+            <a:r>
+              <a:rPr lang="en-US" dirty="0"/>
+              <a:t>Generalization</a:t>
+            </a:r>
+          </a:p>
+        </p:txBody>
+      </p:sp>
+      <p:sp>
+        <p:nvSpPr>
+          <p:cNvPr id="3" name="Content Placeholder 2">
+            <a:extLst>
+              <a:ext uri="{FF2B5EF4-FFF2-40B4-BE49-F238E27FC236}">
+                <a16:creationId xmlns:a16="http://schemas.microsoft.com/office/drawing/2014/main" id="{8C32E7EA-0D6B-857F-1582-E3F379E58744}"/>
+              </a:ext>
+            </a:extLst>
+          </p:cNvPr>
+          <p:cNvSpPr>
+            <a:spLocks noGrp="1"/>
+          </p:cNvSpPr>
+          <p:nvPr>
+            <p:ph idx="1"/>
+          </p:nvPr>
+        </p:nvSpPr>
+        <p:spPr>
+          <a:xfrm>
+            <a:off x="685800" y="1955455"/>
+            <a:ext cx="10131425" cy="3649133"/>
+          </a:xfrm>
+        </p:spPr>
+        <p:txBody>
+          <a:bodyPr/>
+          <a:lstStyle/>
+          <a:p>
+            <a:r>
+              <a:rPr lang="en-US" dirty="0"/>
+              <a:t>Can be achieved on the function level by making them have only one responsibility</a:t>
+            </a:r>
+          </a:p>
+          <a:p>
+            <a:r>
+              <a:rPr lang="en-US" dirty="0"/>
+              <a:t>It also can be achieved on the class level through inheritance by taking the common and shared characteristics among some classes and generalize them into one base class and make the specialized classes inherit from it</a:t>
+            </a:r>
+          </a:p>
+          <a:p>
+            <a:r>
+              <a:rPr lang="en-US" dirty="0"/>
+              <a:t>They are both used to achieve the D.R.Y principle which stands for Don’t Repeat Yourself</a:t>
+            </a:r>
+          </a:p>
+        </p:txBody>
+      </p:sp>
+    </p:spTree>
+    <p:extLst>
+      <p:ext uri="{BB962C8B-B14F-4D97-AF65-F5344CB8AC3E}">
+        <p14:creationId xmlns:p14="http://schemas.microsoft.com/office/powerpoint/2010/main" val="168353366"/>
       </p:ext>
     </p:extLst>
   </p:cSld>

</xml_diff>

<commit_message>
added some text and hacking resources
</commit_message>
<xml_diff>
--- a/Study/Object Oriented Design/Week 1 Objectives.pptx
+++ b/Study/Object Oriented Design/Week 1 Objectives.pptx
@@ -38,6 +38,16 @@
     <p:sldId id="284" r:id="rId32"/>
     <p:sldId id="287" r:id="rId33"/>
     <p:sldId id="277" r:id="rId34"/>
+    <p:sldId id="289" r:id="rId35"/>
+    <p:sldId id="290" r:id="rId36"/>
+    <p:sldId id="292" r:id="rId37"/>
+    <p:sldId id="293" r:id="rId38"/>
+    <p:sldId id="294" r:id="rId39"/>
+    <p:sldId id="295" r:id="rId40"/>
+    <p:sldId id="296" r:id="rId41"/>
+    <p:sldId id="291" r:id="rId42"/>
+    <p:sldId id="297" r:id="rId43"/>
+    <p:sldId id="298" r:id="rId44"/>
   </p:sldIdLst>
   <p:sldSz cx="12192000" cy="6858000"/>
   <p:notesSz cx="6858000" cy="9144000"/>
@@ -373,7 +383,7 @@
           <a:p>
             <a:fld id="{E26E7A6D-C62F-4F7B-AB9A-BB912D12E382}" type="datetimeFigureOut">
               <a:rPr lang="en-US" smtClean="0"/>
-              <a:t>5/26/2023</a:t>
+              <a:t>6/5/2023</a:t>
             </a:fld>
             <a:endParaRPr lang="en-US"/>
           </a:p>
@@ -707,7 +717,7 @@
           <a:p>
             <a:fld id="{E26E7A6D-C62F-4F7B-AB9A-BB912D12E382}" type="datetimeFigureOut">
               <a:rPr lang="en-US" smtClean="0"/>
-              <a:t>5/26/2023</a:t>
+              <a:t>6/5/2023</a:t>
             </a:fld>
             <a:endParaRPr lang="en-US"/>
           </a:p>
@@ -985,7 +995,7 @@
           <a:p>
             <a:fld id="{E26E7A6D-C62F-4F7B-AB9A-BB912D12E382}" type="datetimeFigureOut">
               <a:rPr lang="en-US" smtClean="0"/>
-              <a:t>5/26/2023</a:t>
+              <a:t>6/5/2023</a:t>
             </a:fld>
             <a:endParaRPr lang="en-US"/>
           </a:p>
@@ -1553,7 +1563,7 @@
           <a:p>
             <a:fld id="{E26E7A6D-C62F-4F7B-AB9A-BB912D12E382}" type="datetimeFigureOut">
               <a:rPr lang="en-US" smtClean="0"/>
-              <a:t>5/26/2023</a:t>
+              <a:t>6/5/2023</a:t>
             </a:fld>
             <a:endParaRPr lang="en-US"/>
           </a:p>
@@ -1831,7 +1841,7 @@
           <a:p>
             <a:fld id="{E26E7A6D-C62F-4F7B-AB9A-BB912D12E382}" type="datetimeFigureOut">
               <a:rPr lang="en-US" smtClean="0"/>
-              <a:t>5/26/2023</a:t>
+              <a:t>6/5/2023</a:t>
             </a:fld>
             <a:endParaRPr lang="en-US"/>
           </a:p>
@@ -2393,7 +2403,7 @@
           <a:p>
             <a:fld id="{E26E7A6D-C62F-4F7B-AB9A-BB912D12E382}" type="datetimeFigureOut">
               <a:rPr lang="en-US" smtClean="0"/>
-              <a:t>5/26/2023</a:t>
+              <a:t>6/5/2023</a:t>
             </a:fld>
             <a:endParaRPr lang="en-US"/>
           </a:p>
@@ -2720,7 +2730,7 @@
           <a:p>
             <a:fld id="{E26E7A6D-C62F-4F7B-AB9A-BB912D12E382}" type="datetimeFigureOut">
               <a:rPr lang="en-US" smtClean="0"/>
-              <a:t>5/26/2023</a:t>
+              <a:t>6/5/2023</a:t>
             </a:fld>
             <a:endParaRPr lang="en-US"/>
           </a:p>
@@ -2897,7 +2907,7 @@
           <a:p>
             <a:fld id="{E26E7A6D-C62F-4F7B-AB9A-BB912D12E382}" type="datetimeFigureOut">
               <a:rPr lang="en-US" smtClean="0"/>
-              <a:t>5/26/2023</a:t>
+              <a:t>6/5/2023</a:t>
             </a:fld>
             <a:endParaRPr lang="en-US"/>
           </a:p>
@@ -3135,7 +3145,7 @@
           <a:p>
             <a:fld id="{E26E7A6D-C62F-4F7B-AB9A-BB912D12E382}" type="datetimeFigureOut">
               <a:rPr lang="en-US" smtClean="0"/>
-              <a:t>5/26/2023</a:t>
+              <a:t>6/5/2023</a:t>
             </a:fld>
             <a:endParaRPr lang="en-US"/>
           </a:p>
@@ -3335,7 +3345,7 @@
           <a:p>
             <a:fld id="{E26E7A6D-C62F-4F7B-AB9A-BB912D12E382}" type="datetimeFigureOut">
               <a:rPr lang="en-US" smtClean="0"/>
-              <a:t>5/26/2023</a:t>
+              <a:t>6/5/2023</a:t>
             </a:fld>
             <a:endParaRPr lang="en-US"/>
           </a:p>
@@ -3611,7 +3621,7 @@
           <a:p>
             <a:fld id="{E26E7A6D-C62F-4F7B-AB9A-BB912D12E382}" type="datetimeFigureOut">
               <a:rPr lang="en-US" smtClean="0"/>
-              <a:t>5/26/2023</a:t>
+              <a:t>6/5/2023</a:t>
             </a:fld>
             <a:endParaRPr lang="en-US"/>
           </a:p>
@@ -3877,7 +3887,7 @@
           <a:p>
             <a:fld id="{E26E7A6D-C62F-4F7B-AB9A-BB912D12E382}" type="datetimeFigureOut">
               <a:rPr lang="en-US" smtClean="0"/>
-              <a:t>5/26/2023</a:t>
+              <a:t>6/5/2023</a:t>
             </a:fld>
             <a:endParaRPr lang="en-US"/>
           </a:p>
@@ -4251,7 +4261,7 @@
           <a:p>
             <a:fld id="{E26E7A6D-C62F-4F7B-AB9A-BB912D12E382}" type="datetimeFigureOut">
               <a:rPr lang="en-US" smtClean="0"/>
-              <a:t>5/26/2023</a:t>
+              <a:t>6/5/2023</a:t>
             </a:fld>
             <a:endParaRPr lang="en-US"/>
           </a:p>
@@ -4399,7 +4409,7 @@
           <a:p>
             <a:fld id="{E26E7A6D-C62F-4F7B-AB9A-BB912D12E382}" type="datetimeFigureOut">
               <a:rPr lang="en-US" smtClean="0"/>
-              <a:t>5/26/2023</a:t>
+              <a:t>6/5/2023</a:t>
             </a:fld>
             <a:endParaRPr lang="en-US"/>
           </a:p>
@@ -4524,7 +4534,7 @@
           <a:p>
             <a:fld id="{E26E7A6D-C62F-4F7B-AB9A-BB912D12E382}" type="datetimeFigureOut">
               <a:rPr lang="en-US" smtClean="0"/>
-              <a:t>5/26/2023</a:t>
+              <a:t>6/5/2023</a:t>
             </a:fld>
             <a:endParaRPr lang="en-US"/>
           </a:p>
@@ -4809,7 +4819,7 @@
           <a:p>
             <a:fld id="{E26E7A6D-C62F-4F7B-AB9A-BB912D12E382}" type="datetimeFigureOut">
               <a:rPr lang="en-US" smtClean="0"/>
-              <a:t>5/26/2023</a:t>
+              <a:t>6/5/2023</a:t>
             </a:fld>
             <a:endParaRPr lang="en-US"/>
           </a:p>
@@ -5133,7 +5143,7 @@
           <a:p>
             <a:fld id="{E26E7A6D-C62F-4F7B-AB9A-BB912D12E382}" type="datetimeFigureOut">
               <a:rPr lang="en-US" smtClean="0"/>
-              <a:t>5/26/2023</a:t>
+              <a:t>6/5/2023</a:t>
             </a:fld>
             <a:endParaRPr lang="en-US"/>
           </a:p>
@@ -5347,7 +5357,7 @@
           <a:p>
             <a:fld id="{E26E7A6D-C62F-4F7B-AB9A-BB912D12E382}" type="datetimeFigureOut">
               <a:rPr lang="en-US" smtClean="0"/>
-              <a:t>5/26/2023</a:t>
+              <a:t>6/5/2023</a:t>
             </a:fld>
             <a:endParaRPr lang="en-US"/>
           </a:p>
@@ -6278,7 +6288,27 @@
               <a:rPr lang="en-AU" sz="2400" dirty="0"/>
               <a:t>You must ask the client about the trade-offs</a:t>
             </a:r>
-            <a:endParaRPr lang="en-US" sz="2400" dirty="0"/>
+          </a:p>
+          <a:p>
+            <a:r>
+              <a:rPr lang="en-AU" sz="2400" dirty="0">
+                <a:solidFill>
+                  <a:schemeClr val="bg1"/>
+                </a:solidFill>
+                <a:highlight>
+                  <a:srgbClr val="FFFF00"/>
+                </a:highlight>
+              </a:rPr>
+              <a:t>NOTE: you can also write the requirements in a form that is more detailed and may contain technical details for Developers.</a:t>
+            </a:r>
+            <a:endParaRPr lang="en-US" sz="2400" dirty="0">
+              <a:solidFill>
+                <a:schemeClr val="bg1"/>
+              </a:solidFill>
+              <a:highlight>
+                <a:srgbClr val="FFFF00"/>
+              </a:highlight>
+            </a:endParaRPr>
           </a:p>
         </p:txBody>
       </p:sp>
@@ -8671,6 +8701,587 @@
 </p:sld>
 </file>
 
+<file path=ppt/slides/slide34.xml><?xml version="1.0" encoding="utf-8"?>
+<p:sld xmlns:a="http://schemas.openxmlformats.org/drawingml/2006/main" xmlns:r="http://schemas.openxmlformats.org/officeDocument/2006/relationships" xmlns:p="http://schemas.openxmlformats.org/presentationml/2006/main">
+  <p:cSld>
+    <p:spTree>
+      <p:nvGrpSpPr>
+        <p:cNvPr id="1" name=""/>
+        <p:cNvGrpSpPr/>
+        <p:nvPr/>
+      </p:nvGrpSpPr>
+      <p:grpSpPr>
+        <a:xfrm>
+          <a:off x="0" y="0"/>
+          <a:ext cx="0" cy="0"/>
+          <a:chOff x="0" y="0"/>
+          <a:chExt cx="0" cy="0"/>
+        </a:xfrm>
+      </p:grpSpPr>
+      <p:sp>
+        <p:nvSpPr>
+          <p:cNvPr id="2" name="Title 1">
+            <a:extLst>
+              <a:ext uri="{FF2B5EF4-FFF2-40B4-BE49-F238E27FC236}">
+                <a16:creationId xmlns:a16="http://schemas.microsoft.com/office/drawing/2014/main" id="{4E30F433-FE11-B499-D9CF-A2754CCA7FA1}"/>
+              </a:ext>
+            </a:extLst>
+          </p:cNvPr>
+          <p:cNvSpPr>
+            <a:spLocks noGrp="1"/>
+          </p:cNvSpPr>
+          <p:nvPr>
+            <p:ph type="title"/>
+          </p:nvPr>
+        </p:nvSpPr>
+        <p:spPr/>
+        <p:txBody>
+          <a:bodyPr/>
+          <a:lstStyle/>
+          <a:p>
+            <a:r>
+              <a:rPr lang="en-US" dirty="0"/>
+              <a:t>Evaluating your design complexity</a:t>
+            </a:r>
+          </a:p>
+        </p:txBody>
+      </p:sp>
+      <p:sp>
+        <p:nvSpPr>
+          <p:cNvPr id="3" name="Content Placeholder 2">
+            <a:extLst>
+              <a:ext uri="{FF2B5EF4-FFF2-40B4-BE49-F238E27FC236}">
+                <a16:creationId xmlns:a16="http://schemas.microsoft.com/office/drawing/2014/main" id="{323F072C-F9C1-3088-F372-CBB2561FBADC}"/>
+              </a:ext>
+            </a:extLst>
+          </p:cNvPr>
+          <p:cNvSpPr>
+            <a:spLocks noGrp="1"/>
+          </p:cNvSpPr>
+          <p:nvPr>
+            <p:ph idx="1"/>
+          </p:nvPr>
+        </p:nvSpPr>
+        <p:spPr/>
+        <p:txBody>
+          <a:bodyPr>
+            <a:normAutofit/>
+          </a:bodyPr>
+          <a:lstStyle/>
+          <a:p>
+            <a:r>
+              <a:rPr lang="en-US" sz="4000" dirty="0"/>
+              <a:t>This can be achieved through:</a:t>
+            </a:r>
+          </a:p>
+          <a:p>
+            <a:pPr lvl="1"/>
+            <a:r>
+              <a:rPr lang="en-US" sz="3600" dirty="0"/>
+              <a:t>Coupling</a:t>
+            </a:r>
+          </a:p>
+          <a:p>
+            <a:pPr lvl="1"/>
+            <a:r>
+              <a:rPr lang="en-US" sz="3600" dirty="0"/>
+              <a:t>Cohesion</a:t>
+            </a:r>
+          </a:p>
+        </p:txBody>
+      </p:sp>
+    </p:spTree>
+    <p:extLst>
+      <p:ext uri="{BB962C8B-B14F-4D97-AF65-F5344CB8AC3E}">
+        <p14:creationId xmlns:p14="http://schemas.microsoft.com/office/powerpoint/2010/main" val="715333540"/>
+      </p:ext>
+    </p:extLst>
+  </p:cSld>
+  <p:clrMapOvr>
+    <a:masterClrMapping/>
+  </p:clrMapOvr>
+</p:sld>
+</file>
+
+<file path=ppt/slides/slide35.xml><?xml version="1.0" encoding="utf-8"?>
+<p:sld xmlns:a="http://schemas.openxmlformats.org/drawingml/2006/main" xmlns:r="http://schemas.openxmlformats.org/officeDocument/2006/relationships" xmlns:p="http://schemas.openxmlformats.org/presentationml/2006/main">
+  <p:cSld>
+    <p:spTree>
+      <p:nvGrpSpPr>
+        <p:cNvPr id="1" name=""/>
+        <p:cNvGrpSpPr/>
+        <p:nvPr/>
+      </p:nvGrpSpPr>
+      <p:grpSpPr>
+        <a:xfrm>
+          <a:off x="0" y="0"/>
+          <a:ext cx="0" cy="0"/>
+          <a:chOff x="0" y="0"/>
+          <a:chExt cx="0" cy="0"/>
+        </a:xfrm>
+      </p:grpSpPr>
+      <p:sp>
+        <p:nvSpPr>
+          <p:cNvPr id="2" name="Title 1">
+            <a:extLst>
+              <a:ext uri="{FF2B5EF4-FFF2-40B4-BE49-F238E27FC236}">
+                <a16:creationId xmlns:a16="http://schemas.microsoft.com/office/drawing/2014/main" id="{7BDCFAC8-CFCD-2BAC-B8B1-E7C74144FDEF}"/>
+              </a:ext>
+            </a:extLst>
+          </p:cNvPr>
+          <p:cNvSpPr>
+            <a:spLocks noGrp="1"/>
+          </p:cNvSpPr>
+          <p:nvPr>
+            <p:ph type="title"/>
+          </p:nvPr>
+        </p:nvSpPr>
+        <p:spPr/>
+        <p:txBody>
+          <a:bodyPr/>
+          <a:lstStyle/>
+          <a:p>
+            <a:r>
+              <a:rPr lang="en-US" dirty="0"/>
+              <a:t>Coupling</a:t>
+            </a:r>
+          </a:p>
+        </p:txBody>
+      </p:sp>
+      <p:sp>
+        <p:nvSpPr>
+          <p:cNvPr id="3" name="Content Placeholder 2">
+            <a:extLst>
+              <a:ext uri="{FF2B5EF4-FFF2-40B4-BE49-F238E27FC236}">
+                <a16:creationId xmlns:a16="http://schemas.microsoft.com/office/drawing/2014/main" id="{D044874F-6C41-C6B1-A9D2-567731D1D4F7}"/>
+              </a:ext>
+            </a:extLst>
+          </p:cNvPr>
+          <p:cNvSpPr>
+            <a:spLocks noGrp="1"/>
+          </p:cNvSpPr>
+          <p:nvPr>
+            <p:ph idx="1"/>
+          </p:nvPr>
+        </p:nvSpPr>
+        <p:spPr/>
+        <p:txBody>
+          <a:bodyPr>
+            <a:normAutofit/>
+          </a:bodyPr>
+          <a:lstStyle/>
+          <a:p>
+            <a:r>
+              <a:rPr lang="en-US" sz="3600" dirty="0"/>
+              <a:t>Focuses on the complexity between modules and other modules</a:t>
+            </a:r>
+          </a:p>
+          <a:p>
+            <a:r>
+              <a:rPr lang="en-US" sz="2400" dirty="0"/>
+              <a:t>NOTE: module here refers to methods and classes</a:t>
+            </a:r>
+          </a:p>
+        </p:txBody>
+      </p:sp>
+    </p:spTree>
+    <p:extLst>
+      <p:ext uri="{BB962C8B-B14F-4D97-AF65-F5344CB8AC3E}">
+        <p14:creationId xmlns:p14="http://schemas.microsoft.com/office/powerpoint/2010/main" val="1308441351"/>
+      </p:ext>
+    </p:extLst>
+  </p:cSld>
+  <p:clrMapOvr>
+    <a:masterClrMapping/>
+  </p:clrMapOvr>
+</p:sld>
+</file>
+
+<file path=ppt/slides/slide36.xml><?xml version="1.0" encoding="utf-8"?>
+<p:sld xmlns:a="http://schemas.openxmlformats.org/drawingml/2006/main" xmlns:r="http://schemas.openxmlformats.org/officeDocument/2006/relationships" xmlns:p="http://schemas.openxmlformats.org/presentationml/2006/main">
+  <p:cSld>
+    <p:spTree>
+      <p:nvGrpSpPr>
+        <p:cNvPr id="1" name=""/>
+        <p:cNvGrpSpPr/>
+        <p:nvPr/>
+      </p:nvGrpSpPr>
+      <p:grpSpPr>
+        <a:xfrm>
+          <a:off x="0" y="0"/>
+          <a:ext cx="0" cy="0"/>
+          <a:chOff x="0" y="0"/>
+          <a:chExt cx="0" cy="0"/>
+        </a:xfrm>
+      </p:grpSpPr>
+      <p:sp>
+        <p:nvSpPr>
+          <p:cNvPr id="2" name="Title 1">
+            <a:extLst>
+              <a:ext uri="{FF2B5EF4-FFF2-40B4-BE49-F238E27FC236}">
+                <a16:creationId xmlns:a16="http://schemas.microsoft.com/office/drawing/2014/main" id="{9137F068-F8BE-EF22-FEEA-43346C10984A}"/>
+              </a:ext>
+            </a:extLst>
+          </p:cNvPr>
+          <p:cNvSpPr>
+            <a:spLocks noGrp="1"/>
+          </p:cNvSpPr>
+          <p:nvPr>
+            <p:ph type="title"/>
+          </p:nvPr>
+        </p:nvSpPr>
+        <p:spPr/>
+        <p:txBody>
+          <a:bodyPr/>
+          <a:lstStyle/>
+          <a:p>
+            <a:r>
+              <a:rPr lang="en-US" dirty="0"/>
+              <a:t>Coupling</a:t>
+            </a:r>
+          </a:p>
+        </p:txBody>
+      </p:sp>
+      <p:sp>
+        <p:nvSpPr>
+          <p:cNvPr id="3" name="Content Placeholder 2">
+            <a:extLst>
+              <a:ext uri="{FF2B5EF4-FFF2-40B4-BE49-F238E27FC236}">
+                <a16:creationId xmlns:a16="http://schemas.microsoft.com/office/drawing/2014/main" id="{10B34F74-D5C3-346B-BD82-AEFA6D764438}"/>
+              </a:ext>
+            </a:extLst>
+          </p:cNvPr>
+          <p:cNvSpPr>
+            <a:spLocks noGrp="1"/>
+          </p:cNvSpPr>
+          <p:nvPr>
+            <p:ph idx="1"/>
+          </p:nvPr>
+        </p:nvSpPr>
+        <p:spPr/>
+        <p:txBody>
+          <a:bodyPr>
+            <a:normAutofit/>
+          </a:bodyPr>
+          <a:lstStyle/>
+          <a:p>
+            <a:r>
+              <a:rPr lang="en-US" sz="3600" dirty="0"/>
+              <a:t>When evaluating the coupling of the modules of your system you need to think about 3 ideas:</a:t>
+            </a:r>
+          </a:p>
+          <a:p>
+            <a:pPr lvl="1"/>
+            <a:r>
+              <a:rPr lang="en-US" sz="3200" dirty="0"/>
+              <a:t>Ease</a:t>
+            </a:r>
+          </a:p>
+          <a:p>
+            <a:pPr lvl="1"/>
+            <a:r>
+              <a:rPr lang="en-US" sz="3200" dirty="0"/>
+              <a:t>Degree</a:t>
+            </a:r>
+          </a:p>
+          <a:p>
+            <a:pPr lvl="1"/>
+            <a:r>
+              <a:rPr lang="en-US" sz="3200" dirty="0"/>
+              <a:t>Flexibility</a:t>
+            </a:r>
+          </a:p>
+        </p:txBody>
+      </p:sp>
+    </p:spTree>
+    <p:extLst>
+      <p:ext uri="{BB962C8B-B14F-4D97-AF65-F5344CB8AC3E}">
+        <p14:creationId xmlns:p14="http://schemas.microsoft.com/office/powerpoint/2010/main" val="98665899"/>
+      </p:ext>
+    </p:extLst>
+  </p:cSld>
+  <p:clrMapOvr>
+    <a:masterClrMapping/>
+  </p:clrMapOvr>
+</p:sld>
+</file>
+
+<file path=ppt/slides/slide37.xml><?xml version="1.0" encoding="utf-8"?>
+<p:sld xmlns:a="http://schemas.openxmlformats.org/drawingml/2006/main" xmlns:r="http://schemas.openxmlformats.org/officeDocument/2006/relationships" xmlns:p="http://schemas.openxmlformats.org/presentationml/2006/main">
+  <p:cSld>
+    <p:spTree>
+      <p:nvGrpSpPr>
+        <p:cNvPr id="1" name=""/>
+        <p:cNvGrpSpPr/>
+        <p:nvPr/>
+      </p:nvGrpSpPr>
+      <p:grpSpPr>
+        <a:xfrm>
+          <a:off x="0" y="0"/>
+          <a:ext cx="0" cy="0"/>
+          <a:chOff x="0" y="0"/>
+          <a:chExt cx="0" cy="0"/>
+        </a:xfrm>
+      </p:grpSpPr>
+      <p:sp>
+        <p:nvSpPr>
+          <p:cNvPr id="2" name="Title 1">
+            <a:extLst>
+              <a:ext uri="{FF2B5EF4-FFF2-40B4-BE49-F238E27FC236}">
+                <a16:creationId xmlns:a16="http://schemas.microsoft.com/office/drawing/2014/main" id="{C2C516FA-E96B-2BEC-4847-8E239E907F32}"/>
+              </a:ext>
+            </a:extLst>
+          </p:cNvPr>
+          <p:cNvSpPr>
+            <a:spLocks noGrp="1"/>
+          </p:cNvSpPr>
+          <p:nvPr>
+            <p:ph type="title"/>
+          </p:nvPr>
+        </p:nvSpPr>
+        <p:spPr/>
+        <p:txBody>
+          <a:bodyPr/>
+          <a:lstStyle/>
+          <a:p>
+            <a:r>
+              <a:rPr lang="en-US" dirty="0"/>
+              <a:t>Degree</a:t>
+            </a:r>
+          </a:p>
+        </p:txBody>
+      </p:sp>
+      <p:sp>
+        <p:nvSpPr>
+          <p:cNvPr id="3" name="Content Placeholder 2">
+            <a:extLst>
+              <a:ext uri="{FF2B5EF4-FFF2-40B4-BE49-F238E27FC236}">
+                <a16:creationId xmlns:a16="http://schemas.microsoft.com/office/drawing/2014/main" id="{4E1BC85C-25C0-A798-1C29-43CE442FA69B}"/>
+              </a:ext>
+            </a:extLst>
+          </p:cNvPr>
+          <p:cNvSpPr>
+            <a:spLocks noGrp="1"/>
+          </p:cNvSpPr>
+          <p:nvPr>
+            <p:ph idx="1"/>
+          </p:nvPr>
+        </p:nvSpPr>
+        <p:spPr/>
+        <p:txBody>
+          <a:bodyPr>
+            <a:normAutofit/>
+          </a:bodyPr>
+          <a:lstStyle/>
+          <a:p>
+            <a:r>
+              <a:rPr lang="en-US" sz="2800" dirty="0"/>
+              <a:t>Is the number of connections between a module and other modules</a:t>
+            </a:r>
+          </a:p>
+          <a:p>
+            <a:r>
+              <a:rPr lang="en-US" sz="2800" dirty="0"/>
+              <a:t>The less connections your modules have with each other the better your design become</a:t>
+            </a:r>
+          </a:p>
+        </p:txBody>
+      </p:sp>
+    </p:spTree>
+    <p:extLst>
+      <p:ext uri="{BB962C8B-B14F-4D97-AF65-F5344CB8AC3E}">
+        <p14:creationId xmlns:p14="http://schemas.microsoft.com/office/powerpoint/2010/main" val="514636855"/>
+      </p:ext>
+    </p:extLst>
+  </p:cSld>
+  <p:clrMapOvr>
+    <a:masterClrMapping/>
+  </p:clrMapOvr>
+</p:sld>
+</file>
+
+<file path=ppt/slides/slide38.xml><?xml version="1.0" encoding="utf-8"?>
+<p:sld xmlns:a="http://schemas.openxmlformats.org/drawingml/2006/main" xmlns:r="http://schemas.openxmlformats.org/officeDocument/2006/relationships" xmlns:p="http://schemas.openxmlformats.org/presentationml/2006/main">
+  <p:cSld>
+    <p:spTree>
+      <p:nvGrpSpPr>
+        <p:cNvPr id="1" name=""/>
+        <p:cNvGrpSpPr/>
+        <p:nvPr/>
+      </p:nvGrpSpPr>
+      <p:grpSpPr>
+        <a:xfrm>
+          <a:off x="0" y="0"/>
+          <a:ext cx="0" cy="0"/>
+          <a:chOff x="0" y="0"/>
+          <a:chExt cx="0" cy="0"/>
+        </a:xfrm>
+      </p:grpSpPr>
+      <p:sp>
+        <p:nvSpPr>
+          <p:cNvPr id="2" name="Title 1">
+            <a:extLst>
+              <a:ext uri="{FF2B5EF4-FFF2-40B4-BE49-F238E27FC236}">
+                <a16:creationId xmlns:a16="http://schemas.microsoft.com/office/drawing/2014/main" id="{63693A92-B0A1-E7E7-0C3E-19B9062D76A5}"/>
+              </a:ext>
+            </a:extLst>
+          </p:cNvPr>
+          <p:cNvSpPr>
+            <a:spLocks noGrp="1"/>
+          </p:cNvSpPr>
+          <p:nvPr>
+            <p:ph type="title"/>
+          </p:nvPr>
+        </p:nvSpPr>
+        <p:spPr/>
+        <p:txBody>
+          <a:bodyPr/>
+          <a:lstStyle/>
+          <a:p>
+            <a:r>
+              <a:rPr lang="en-US" dirty="0"/>
+              <a:t>Degree Examples</a:t>
+            </a:r>
+          </a:p>
+        </p:txBody>
+      </p:sp>
+      <p:sp>
+        <p:nvSpPr>
+          <p:cNvPr id="3" name="Content Placeholder 2">
+            <a:extLst>
+              <a:ext uri="{FF2B5EF4-FFF2-40B4-BE49-F238E27FC236}">
+                <a16:creationId xmlns:a16="http://schemas.microsoft.com/office/drawing/2014/main" id="{3A3FA36D-D6F3-FFB8-7AD2-F3D1B45ABC97}"/>
+              </a:ext>
+            </a:extLst>
+          </p:cNvPr>
+          <p:cNvSpPr>
+            <a:spLocks noGrp="1"/>
+          </p:cNvSpPr>
+          <p:nvPr>
+            <p:ph idx="1"/>
+          </p:nvPr>
+        </p:nvSpPr>
+        <p:spPr/>
+        <p:txBody>
+          <a:bodyPr>
+            <a:normAutofit/>
+          </a:bodyPr>
+          <a:lstStyle/>
+          <a:p>
+            <a:r>
+              <a:rPr lang="en-US" sz="3200" dirty="0"/>
+              <a:t>Keep the number of modules that you count on as low as possible</a:t>
+            </a:r>
+          </a:p>
+          <a:p>
+            <a:r>
+              <a:rPr lang="en-US" sz="3200" dirty="0"/>
+              <a:t>Make your functions take less arguments as possible as you could</a:t>
+            </a:r>
+          </a:p>
+        </p:txBody>
+      </p:sp>
+    </p:spTree>
+    <p:extLst>
+      <p:ext uri="{BB962C8B-B14F-4D97-AF65-F5344CB8AC3E}">
+        <p14:creationId xmlns:p14="http://schemas.microsoft.com/office/powerpoint/2010/main" val="3628832777"/>
+      </p:ext>
+    </p:extLst>
+  </p:cSld>
+  <p:clrMapOvr>
+    <a:masterClrMapping/>
+  </p:clrMapOvr>
+</p:sld>
+</file>
+
+<file path=ppt/slides/slide39.xml><?xml version="1.0" encoding="utf-8"?>
+<p:sld xmlns:a="http://schemas.openxmlformats.org/drawingml/2006/main" xmlns:r="http://schemas.openxmlformats.org/officeDocument/2006/relationships" xmlns:p="http://schemas.openxmlformats.org/presentationml/2006/main">
+  <p:cSld>
+    <p:spTree>
+      <p:nvGrpSpPr>
+        <p:cNvPr id="1" name=""/>
+        <p:cNvGrpSpPr/>
+        <p:nvPr/>
+      </p:nvGrpSpPr>
+      <p:grpSpPr>
+        <a:xfrm>
+          <a:off x="0" y="0"/>
+          <a:ext cx="0" cy="0"/>
+          <a:chOff x="0" y="0"/>
+          <a:chExt cx="0" cy="0"/>
+        </a:xfrm>
+      </p:grpSpPr>
+      <p:sp>
+        <p:nvSpPr>
+          <p:cNvPr id="2" name="Title 1">
+            <a:extLst>
+              <a:ext uri="{FF2B5EF4-FFF2-40B4-BE49-F238E27FC236}">
+                <a16:creationId xmlns:a16="http://schemas.microsoft.com/office/drawing/2014/main" id="{1F6B574C-C5D8-A5FA-3D6F-1D6F069AFCFE}"/>
+              </a:ext>
+            </a:extLst>
+          </p:cNvPr>
+          <p:cNvSpPr>
+            <a:spLocks noGrp="1"/>
+          </p:cNvSpPr>
+          <p:nvPr>
+            <p:ph type="title"/>
+          </p:nvPr>
+        </p:nvSpPr>
+        <p:spPr/>
+        <p:txBody>
+          <a:bodyPr/>
+          <a:lstStyle/>
+          <a:p>
+            <a:r>
+              <a:rPr lang="en-US" dirty="0"/>
+              <a:t>Ease</a:t>
+            </a:r>
+          </a:p>
+        </p:txBody>
+      </p:sp>
+      <p:sp>
+        <p:nvSpPr>
+          <p:cNvPr id="3" name="Content Placeholder 2">
+            <a:extLst>
+              <a:ext uri="{FF2B5EF4-FFF2-40B4-BE49-F238E27FC236}">
+                <a16:creationId xmlns:a16="http://schemas.microsoft.com/office/drawing/2014/main" id="{A25ED792-0B74-383D-BDAC-F82BA4B9C12F}"/>
+              </a:ext>
+            </a:extLst>
+          </p:cNvPr>
+          <p:cNvSpPr>
+            <a:spLocks noGrp="1"/>
+          </p:cNvSpPr>
+          <p:nvPr>
+            <p:ph idx="1"/>
+          </p:nvPr>
+        </p:nvSpPr>
+        <p:spPr/>
+        <p:txBody>
+          <a:bodyPr>
+            <a:normAutofit/>
+          </a:bodyPr>
+          <a:lstStyle/>
+          <a:p>
+            <a:r>
+              <a:rPr lang="en-US" sz="3600" dirty="0"/>
+              <a:t>The connections between modules should be obvious and clear so that there is no need to make predictions or to view the implementation of each module</a:t>
+            </a:r>
+          </a:p>
+        </p:txBody>
+      </p:sp>
+    </p:spTree>
+    <p:extLst>
+      <p:ext uri="{BB962C8B-B14F-4D97-AF65-F5344CB8AC3E}">
+        <p14:creationId xmlns:p14="http://schemas.microsoft.com/office/powerpoint/2010/main" val="2989694809"/>
+      </p:ext>
+    </p:extLst>
+  </p:cSld>
+  <p:clrMapOvr>
+    <a:masterClrMapping/>
+  </p:clrMapOvr>
+</p:sld>
+</file>
+
 <file path=ppt/slides/slide4.xml><?xml version="1.0" encoding="utf-8"?>
 <p:sld xmlns:a="http://schemas.openxmlformats.org/drawingml/2006/main" xmlns:r="http://schemas.openxmlformats.org/officeDocument/2006/relationships" xmlns:p="http://schemas.openxmlformats.org/presentationml/2006/main">
   <p:cSld>
@@ -8763,6 +9374,365 @@
     <p:extLst>
       <p:ext uri="{BB962C8B-B14F-4D97-AF65-F5344CB8AC3E}">
         <p14:creationId xmlns:p14="http://schemas.microsoft.com/office/powerpoint/2010/main" val="3417707575"/>
+      </p:ext>
+    </p:extLst>
+  </p:cSld>
+  <p:clrMapOvr>
+    <a:masterClrMapping/>
+  </p:clrMapOvr>
+</p:sld>
+</file>
+
+<file path=ppt/slides/slide40.xml><?xml version="1.0" encoding="utf-8"?>
+<p:sld xmlns:a="http://schemas.openxmlformats.org/drawingml/2006/main" xmlns:r="http://schemas.openxmlformats.org/officeDocument/2006/relationships" xmlns:p="http://schemas.openxmlformats.org/presentationml/2006/main">
+  <p:cSld>
+    <p:spTree>
+      <p:nvGrpSpPr>
+        <p:cNvPr id="1" name=""/>
+        <p:cNvGrpSpPr/>
+        <p:nvPr/>
+      </p:nvGrpSpPr>
+      <p:grpSpPr>
+        <a:xfrm>
+          <a:off x="0" y="0"/>
+          <a:ext cx="0" cy="0"/>
+          <a:chOff x="0" y="0"/>
+          <a:chExt cx="0" cy="0"/>
+        </a:xfrm>
+      </p:grpSpPr>
+      <p:sp>
+        <p:nvSpPr>
+          <p:cNvPr id="2" name="Title 1">
+            <a:extLst>
+              <a:ext uri="{FF2B5EF4-FFF2-40B4-BE49-F238E27FC236}">
+                <a16:creationId xmlns:a16="http://schemas.microsoft.com/office/drawing/2014/main" id="{F9159D8D-CF1E-DE71-A1F6-B6BF7E34AD9F}"/>
+              </a:ext>
+            </a:extLst>
+          </p:cNvPr>
+          <p:cNvSpPr>
+            <a:spLocks noGrp="1"/>
+          </p:cNvSpPr>
+          <p:nvPr>
+            <p:ph type="title"/>
+          </p:nvPr>
+        </p:nvSpPr>
+        <p:spPr/>
+        <p:txBody>
+          <a:bodyPr/>
+          <a:lstStyle/>
+          <a:p>
+            <a:r>
+              <a:rPr lang="en-US" dirty="0"/>
+              <a:t>Flexibility</a:t>
+            </a:r>
+          </a:p>
+        </p:txBody>
+      </p:sp>
+      <p:sp>
+        <p:nvSpPr>
+          <p:cNvPr id="3" name="Content Placeholder 2">
+            <a:extLst>
+              <a:ext uri="{FF2B5EF4-FFF2-40B4-BE49-F238E27FC236}">
+                <a16:creationId xmlns:a16="http://schemas.microsoft.com/office/drawing/2014/main" id="{80CD803C-BA34-ACA8-3B14-E0344A11CEC9}"/>
+              </a:ext>
+            </a:extLst>
+          </p:cNvPr>
+          <p:cNvSpPr>
+            <a:spLocks noGrp="1"/>
+          </p:cNvSpPr>
+          <p:nvPr>
+            <p:ph idx="1"/>
+          </p:nvPr>
+        </p:nvSpPr>
+        <p:spPr/>
+        <p:txBody>
+          <a:bodyPr>
+            <a:normAutofit/>
+          </a:bodyPr>
+          <a:lstStyle/>
+          <a:p>
+            <a:r>
+              <a:rPr lang="en-US" sz="2800" dirty="0"/>
+              <a:t>Is how interchangeable the other modules are with your module</a:t>
+            </a:r>
+          </a:p>
+          <a:p>
+            <a:r>
+              <a:rPr lang="en-US" sz="2800" dirty="0"/>
+              <a:t>Code against abstractions not concrete implementations</a:t>
+            </a:r>
+          </a:p>
+        </p:txBody>
+      </p:sp>
+    </p:spTree>
+    <p:extLst>
+      <p:ext uri="{BB962C8B-B14F-4D97-AF65-F5344CB8AC3E}">
+        <p14:creationId xmlns:p14="http://schemas.microsoft.com/office/powerpoint/2010/main" val="4167335901"/>
+      </p:ext>
+    </p:extLst>
+  </p:cSld>
+  <p:clrMapOvr>
+    <a:masterClrMapping/>
+  </p:clrMapOvr>
+</p:sld>
+</file>
+
+<file path=ppt/slides/slide41.xml><?xml version="1.0" encoding="utf-8"?>
+<p:sld xmlns:a="http://schemas.openxmlformats.org/drawingml/2006/main" xmlns:r="http://schemas.openxmlformats.org/officeDocument/2006/relationships" xmlns:p="http://schemas.openxmlformats.org/presentationml/2006/main">
+  <p:cSld>
+    <p:spTree>
+      <p:nvGrpSpPr>
+        <p:cNvPr id="1" name=""/>
+        <p:cNvGrpSpPr/>
+        <p:nvPr/>
+      </p:nvGrpSpPr>
+      <p:grpSpPr>
+        <a:xfrm>
+          <a:off x="0" y="0"/>
+          <a:ext cx="0" cy="0"/>
+          <a:chOff x="0" y="0"/>
+          <a:chExt cx="0" cy="0"/>
+        </a:xfrm>
+      </p:grpSpPr>
+      <p:sp>
+        <p:nvSpPr>
+          <p:cNvPr id="2" name="Title 1">
+            <a:extLst>
+              <a:ext uri="{FF2B5EF4-FFF2-40B4-BE49-F238E27FC236}">
+                <a16:creationId xmlns:a16="http://schemas.microsoft.com/office/drawing/2014/main" id="{E3493148-B8A7-F2C3-0244-D533F925D2EF}"/>
+              </a:ext>
+            </a:extLst>
+          </p:cNvPr>
+          <p:cNvSpPr>
+            <a:spLocks noGrp="1"/>
+          </p:cNvSpPr>
+          <p:nvPr>
+            <p:ph type="title"/>
+          </p:nvPr>
+        </p:nvSpPr>
+        <p:spPr/>
+        <p:txBody>
+          <a:bodyPr/>
+          <a:lstStyle/>
+          <a:p>
+            <a:r>
+              <a:rPr lang="en-US" dirty="0"/>
+              <a:t>Cohesion</a:t>
+            </a:r>
+          </a:p>
+        </p:txBody>
+      </p:sp>
+      <p:sp>
+        <p:nvSpPr>
+          <p:cNvPr id="3" name="Content Placeholder 2">
+            <a:extLst>
+              <a:ext uri="{FF2B5EF4-FFF2-40B4-BE49-F238E27FC236}">
+                <a16:creationId xmlns:a16="http://schemas.microsoft.com/office/drawing/2014/main" id="{B1740AD6-CCC8-912B-D04E-7AEA0128983B}"/>
+              </a:ext>
+            </a:extLst>
+          </p:cNvPr>
+          <p:cNvSpPr>
+            <a:spLocks noGrp="1"/>
+          </p:cNvSpPr>
+          <p:nvPr>
+            <p:ph idx="1"/>
+          </p:nvPr>
+        </p:nvSpPr>
+        <p:spPr/>
+        <p:txBody>
+          <a:bodyPr>
+            <a:normAutofit/>
+          </a:bodyPr>
+          <a:lstStyle/>
+          <a:p>
+            <a:r>
+              <a:rPr lang="en-US" sz="3600" dirty="0"/>
+              <a:t>Focuses on the complexity within a module and how clear the responsibility of a module</a:t>
+            </a:r>
+          </a:p>
+        </p:txBody>
+      </p:sp>
+    </p:spTree>
+    <p:extLst>
+      <p:ext uri="{BB962C8B-B14F-4D97-AF65-F5344CB8AC3E}">
+        <p14:creationId xmlns:p14="http://schemas.microsoft.com/office/powerpoint/2010/main" val="587065484"/>
+      </p:ext>
+    </p:extLst>
+  </p:cSld>
+  <p:clrMapOvr>
+    <a:masterClrMapping/>
+  </p:clrMapOvr>
+</p:sld>
+</file>
+
+<file path=ppt/slides/slide42.xml><?xml version="1.0" encoding="utf-8"?>
+<p:sld xmlns:a="http://schemas.openxmlformats.org/drawingml/2006/main" xmlns:r="http://schemas.openxmlformats.org/officeDocument/2006/relationships" xmlns:p="http://schemas.openxmlformats.org/presentationml/2006/main">
+  <p:cSld>
+    <p:spTree>
+      <p:nvGrpSpPr>
+        <p:cNvPr id="1" name=""/>
+        <p:cNvGrpSpPr/>
+        <p:nvPr/>
+      </p:nvGrpSpPr>
+      <p:grpSpPr>
+        <a:xfrm>
+          <a:off x="0" y="0"/>
+          <a:ext cx="0" cy="0"/>
+          <a:chOff x="0" y="0"/>
+          <a:chExt cx="0" cy="0"/>
+        </a:xfrm>
+      </p:grpSpPr>
+      <p:sp>
+        <p:nvSpPr>
+          <p:cNvPr id="2" name="Title 1">
+            <a:extLst>
+              <a:ext uri="{FF2B5EF4-FFF2-40B4-BE49-F238E27FC236}">
+                <a16:creationId xmlns:a16="http://schemas.microsoft.com/office/drawing/2014/main" id="{D097F1B6-8DC6-2A38-A2E6-7F4688E7A378}"/>
+              </a:ext>
+            </a:extLst>
+          </p:cNvPr>
+          <p:cNvSpPr>
+            <a:spLocks noGrp="1"/>
+          </p:cNvSpPr>
+          <p:nvPr>
+            <p:ph type="title"/>
+          </p:nvPr>
+        </p:nvSpPr>
+        <p:spPr/>
+        <p:txBody>
+          <a:bodyPr/>
+          <a:lstStyle/>
+          <a:p>
+            <a:r>
+              <a:rPr lang="en-US" dirty="0"/>
+              <a:t>Software Design Principles</a:t>
+            </a:r>
+          </a:p>
+        </p:txBody>
+      </p:sp>
+      <p:sp>
+        <p:nvSpPr>
+          <p:cNvPr id="3" name="Content Placeholder 2">
+            <a:extLst>
+              <a:ext uri="{FF2B5EF4-FFF2-40B4-BE49-F238E27FC236}">
+                <a16:creationId xmlns:a16="http://schemas.microsoft.com/office/drawing/2014/main" id="{2C7D65A1-62F7-7E2F-7FBA-ED59D68E0C82}"/>
+              </a:ext>
+            </a:extLst>
+          </p:cNvPr>
+          <p:cNvSpPr>
+            <a:spLocks noGrp="1"/>
+          </p:cNvSpPr>
+          <p:nvPr>
+            <p:ph idx="1"/>
+          </p:nvPr>
+        </p:nvSpPr>
+        <p:spPr/>
+        <p:txBody>
+          <a:bodyPr>
+            <a:normAutofit/>
+          </a:bodyPr>
+          <a:lstStyle/>
+          <a:p>
+            <a:r>
+              <a:rPr lang="en-US" sz="2800" dirty="0"/>
+              <a:t>In general, these principles help us create software that is flexible, reusable and maintainable</a:t>
+            </a:r>
+          </a:p>
+        </p:txBody>
+      </p:sp>
+    </p:spTree>
+    <p:extLst>
+      <p:ext uri="{BB962C8B-B14F-4D97-AF65-F5344CB8AC3E}">
+        <p14:creationId xmlns:p14="http://schemas.microsoft.com/office/powerpoint/2010/main" val="931660661"/>
+      </p:ext>
+    </p:extLst>
+  </p:cSld>
+  <p:clrMapOvr>
+    <a:masterClrMapping/>
+  </p:clrMapOvr>
+</p:sld>
+</file>
+
+<file path=ppt/slides/slide43.xml><?xml version="1.0" encoding="utf-8"?>
+<p:sld xmlns:a="http://schemas.openxmlformats.org/drawingml/2006/main" xmlns:r="http://schemas.openxmlformats.org/officeDocument/2006/relationships" xmlns:p="http://schemas.openxmlformats.org/presentationml/2006/main">
+  <p:cSld>
+    <p:spTree>
+      <p:nvGrpSpPr>
+        <p:cNvPr id="1" name=""/>
+        <p:cNvGrpSpPr/>
+        <p:nvPr/>
+      </p:nvGrpSpPr>
+      <p:grpSpPr>
+        <a:xfrm>
+          <a:off x="0" y="0"/>
+          <a:ext cx="0" cy="0"/>
+          <a:chOff x="0" y="0"/>
+          <a:chExt cx="0" cy="0"/>
+        </a:xfrm>
+      </p:grpSpPr>
+      <p:sp>
+        <p:nvSpPr>
+          <p:cNvPr id="2" name="Title 1">
+            <a:extLst>
+              <a:ext uri="{FF2B5EF4-FFF2-40B4-BE49-F238E27FC236}">
+                <a16:creationId xmlns:a16="http://schemas.microsoft.com/office/drawing/2014/main" id="{D097F1B6-8DC6-2A38-A2E6-7F4688E7A378}"/>
+              </a:ext>
+            </a:extLst>
+          </p:cNvPr>
+          <p:cNvSpPr>
+            <a:spLocks noGrp="1"/>
+          </p:cNvSpPr>
+          <p:nvPr>
+            <p:ph type="title"/>
+          </p:nvPr>
+        </p:nvSpPr>
+        <p:spPr/>
+        <p:txBody>
+          <a:bodyPr/>
+          <a:lstStyle/>
+          <a:p>
+            <a:r>
+              <a:rPr lang="en-US" dirty="0"/>
+              <a:t>Software Design Principles</a:t>
+            </a:r>
+          </a:p>
+        </p:txBody>
+      </p:sp>
+      <p:sp>
+        <p:nvSpPr>
+          <p:cNvPr id="3" name="Content Placeholder 2">
+            <a:extLst>
+              <a:ext uri="{FF2B5EF4-FFF2-40B4-BE49-F238E27FC236}">
+                <a16:creationId xmlns:a16="http://schemas.microsoft.com/office/drawing/2014/main" id="{2C7D65A1-62F7-7E2F-7FBA-ED59D68E0C82}"/>
+              </a:ext>
+            </a:extLst>
+          </p:cNvPr>
+          <p:cNvSpPr>
+            <a:spLocks noGrp="1"/>
+          </p:cNvSpPr>
+          <p:nvPr>
+            <p:ph idx="1"/>
+          </p:nvPr>
+        </p:nvSpPr>
+        <p:spPr/>
+        <p:txBody>
+          <a:bodyPr>
+            <a:normAutofit/>
+          </a:bodyPr>
+          <a:lstStyle/>
+          <a:p>
+            <a:r>
+              <a:rPr lang="en-US" sz="2800"/>
+              <a:t>Separation of Concerns</a:t>
+            </a:r>
+            <a:endParaRPr lang="en-US" sz="2800" dirty="0"/>
+          </a:p>
+        </p:txBody>
+      </p:sp>
+    </p:spTree>
+    <p:extLst>
+      <p:ext uri="{BB962C8B-B14F-4D97-AF65-F5344CB8AC3E}">
+        <p14:creationId xmlns:p14="http://schemas.microsoft.com/office/powerpoint/2010/main" val="3836074413"/>
       </p:ext>
     </p:extLst>
   </p:cSld>

</xml_diff>